<commit_message>
added images, updated slides
</commit_message>
<xml_diff>
--- a/topic_modeling.pptx
+++ b/topic_modeling.pptx
@@ -5,7 +5,7 @@
     <p:sldMasterId id="2147483660" r:id="rId4"/>
   </p:sldMasterIdLst>
   <p:notesMasterIdLst>
-    <p:notesMasterId r:id="rId34"/>
+    <p:notesMasterId r:id="rId35"/>
   </p:notesMasterIdLst>
   <p:sldIdLst>
     <p:sldId id="451" r:id="rId5"/>
@@ -25,18 +25,19 @@
     <p:sldId id="440" r:id="rId19"/>
     <p:sldId id="319" r:id="rId20"/>
     <p:sldId id="455" r:id="rId21"/>
-    <p:sldId id="456" r:id="rId22"/>
-    <p:sldId id="457" r:id="rId23"/>
-    <p:sldId id="458" r:id="rId24"/>
-    <p:sldId id="465" r:id="rId25"/>
-    <p:sldId id="459" r:id="rId26"/>
-    <p:sldId id="460" r:id="rId27"/>
-    <p:sldId id="461" r:id="rId28"/>
-    <p:sldId id="471" r:id="rId29"/>
-    <p:sldId id="468" r:id="rId30"/>
-    <p:sldId id="472" r:id="rId31"/>
-    <p:sldId id="462" r:id="rId32"/>
-    <p:sldId id="464" r:id="rId33"/>
+    <p:sldId id="473" r:id="rId22"/>
+    <p:sldId id="456" r:id="rId23"/>
+    <p:sldId id="457" r:id="rId24"/>
+    <p:sldId id="458" r:id="rId25"/>
+    <p:sldId id="465" r:id="rId26"/>
+    <p:sldId id="459" r:id="rId27"/>
+    <p:sldId id="460" r:id="rId28"/>
+    <p:sldId id="461" r:id="rId29"/>
+    <p:sldId id="471" r:id="rId30"/>
+    <p:sldId id="468" r:id="rId31"/>
+    <p:sldId id="472" r:id="rId32"/>
+    <p:sldId id="462" r:id="rId33"/>
+    <p:sldId id="464" r:id="rId34"/>
   </p:sldIdLst>
   <p:sldSz cx="12192000" cy="6858000"/>
   <p:notesSz cx="6858000" cy="9144000"/>
@@ -9281,7 +9282,7 @@
           </a:lstStyle>
           <a:p>
             <a:fld id="{0B0D6890-8231-47AE-B87B-337B376C737F}" type="datetimeFigureOut">
-              <a:t>8/11/2025</a:t>
+              <a:t>8/15/2025</a:t>
             </a:fld>
             <a:endParaRPr lang="en-US"/>
           </a:p>
@@ -9921,7 +9922,7 @@
           <a:p>
             <a:fld id="{5925F72D-3864-4E1A-91BE-8641223DE907}" type="slidenum">
               <a:rPr lang="en-US" smtClean="0"/>
-              <a:t>18</a:t>
+              <a:t>19</a:t>
             </a:fld>
             <a:endParaRPr lang="en-US"/>
           </a:p>
@@ -10036,7 +10037,7 @@
           <a:p>
             <a:fld id="{5925F72D-3864-4E1A-91BE-8641223DE907}" type="slidenum">
               <a:rPr lang="en-US" smtClean="0"/>
-              <a:t>19</a:t>
+              <a:t>20</a:t>
             </a:fld>
             <a:endParaRPr lang="en-US"/>
           </a:p>
@@ -10151,7 +10152,7 @@
           <a:p>
             <a:fld id="{5925F72D-3864-4E1A-91BE-8641223DE907}" type="slidenum">
               <a:rPr lang="en-US" smtClean="0"/>
-              <a:t>29</a:t>
+              <a:t>30</a:t>
             </a:fld>
             <a:endParaRPr lang="en-US"/>
           </a:p>
@@ -10324,7 +10325,7 @@
           <a:p>
             <a:fld id="{0C56C575-D94E-F044-B574-12900C1740FB}" type="datetimeFigureOut">
               <a:rPr lang="en-US" smtClean="0"/>
-              <a:t>8/11/2025</a:t>
+              <a:t>8/15/2025</a:t>
             </a:fld>
             <a:endParaRPr lang="en-US"/>
           </a:p>
@@ -10447,7 +10448,7 @@
           <a:p>
             <a:fld id="{846CE7D5-CF57-46EF-B807-FDD0502418D4}" type="datetimeFigureOut">
               <a:rPr lang="en-US" smtClean="0"/>
-              <a:t>8/11/2025</a:t>
+              <a:t>8/15/2025</a:t>
             </a:fld>
             <a:endParaRPr lang="en-US"/>
           </a:p>
@@ -10722,7 +10723,7 @@
           <a:p>
             <a:fld id="{846CE7D5-CF57-46EF-B807-FDD0502418D4}" type="datetimeFigureOut">
               <a:rPr lang="en-US" smtClean="0"/>
-              <a:t>8/11/2025</a:t>
+              <a:t>8/15/2025</a:t>
             </a:fld>
             <a:endParaRPr lang="en-US"/>
           </a:p>
@@ -10977,7 +10978,7 @@
           <a:p>
             <a:fld id="{846CE7D5-CF57-46EF-B807-FDD0502418D4}" type="datetimeFigureOut">
               <a:rPr lang="en-US" smtClean="0"/>
-              <a:t>8/11/2025</a:t>
+              <a:t>8/15/2025</a:t>
             </a:fld>
             <a:endParaRPr lang="en-US"/>
           </a:p>
@@ -11145,7 +11146,7 @@
           <a:p>
             <a:fld id="{846CE7D5-CF57-46EF-B807-FDD0502418D4}" type="datetimeFigureOut">
               <a:rPr lang="en-US" smtClean="0"/>
-              <a:t>8/11/2025</a:t>
+              <a:t>8/15/2025</a:t>
             </a:fld>
             <a:endParaRPr lang="en-US"/>
           </a:p>
@@ -11323,7 +11324,7 @@
           <a:p>
             <a:fld id="{846CE7D5-CF57-46EF-B807-FDD0502418D4}" type="datetimeFigureOut">
               <a:rPr lang="en-US" smtClean="0"/>
-              <a:t>8/11/2025</a:t>
+              <a:t>8/15/2025</a:t>
             </a:fld>
             <a:endParaRPr lang="en-US"/>
           </a:p>
@@ -11616,7 +11617,7 @@
           <a:p>
             <a:fld id="{0C56C575-D94E-F044-B574-12900C1740FB}" type="datetimeFigureOut">
               <a:rPr lang="en-US" smtClean="0"/>
-              <a:t>8/11/2025</a:t>
+              <a:t>8/15/2025</a:t>
             </a:fld>
             <a:endParaRPr lang="en-US"/>
           </a:p>
@@ -11900,7 +11901,7 @@
           <a:p>
             <a:fld id="{0C56C575-D94E-F044-B574-12900C1740FB}" type="datetimeFigureOut">
               <a:rPr lang="en-US" smtClean="0"/>
-              <a:t>8/11/2025</a:t>
+              <a:t>8/15/2025</a:t>
             </a:fld>
             <a:endParaRPr lang="en-US"/>
           </a:p>
@@ -12206,7 +12207,7 @@
           <a:p>
             <a:fld id="{846CE7D5-CF57-46EF-B807-FDD0502418D4}" type="datetimeFigureOut">
               <a:rPr lang="en-US" smtClean="0"/>
-              <a:t>8/11/2025</a:t>
+              <a:t>8/15/2025</a:t>
             </a:fld>
             <a:endParaRPr lang="en-US"/>
           </a:p>
@@ -12374,7 +12375,7 @@
           <a:p>
             <a:fld id="{846CE7D5-CF57-46EF-B807-FDD0502418D4}" type="datetimeFigureOut">
               <a:rPr lang="en-US" smtClean="0"/>
-              <a:t>8/11/2025</a:t>
+              <a:t>8/15/2025</a:t>
             </a:fld>
             <a:endParaRPr lang="en-US"/>
           </a:p>
@@ -12619,7 +12620,7 @@
           <a:p>
             <a:fld id="{846CE7D5-CF57-46EF-B807-FDD0502418D4}" type="datetimeFigureOut">
               <a:rPr lang="en-US" smtClean="0"/>
-              <a:t>8/11/2025</a:t>
+              <a:t>8/15/2025</a:t>
             </a:fld>
             <a:endParaRPr lang="en-US"/>
           </a:p>
@@ -12848,7 +12849,7 @@
           <a:p>
             <a:fld id="{846CE7D5-CF57-46EF-B807-FDD0502418D4}" type="datetimeFigureOut">
               <a:rPr lang="en-US" smtClean="0"/>
-              <a:t>8/11/2025</a:t>
+              <a:t>8/15/2025</a:t>
             </a:fld>
             <a:endParaRPr lang="en-US"/>
           </a:p>
@@ -13212,7 +13213,7 @@
           <a:p>
             <a:fld id="{846CE7D5-CF57-46EF-B807-FDD0502418D4}" type="datetimeFigureOut">
               <a:rPr lang="en-US" smtClean="0"/>
-              <a:t>8/11/2025</a:t>
+              <a:t>8/15/2025</a:t>
             </a:fld>
             <a:endParaRPr lang="en-US"/>
           </a:p>
@@ -13329,7 +13330,7 @@
           <a:p>
             <a:fld id="{846CE7D5-CF57-46EF-B807-FDD0502418D4}" type="datetimeFigureOut">
               <a:rPr lang="en-US" smtClean="0"/>
-              <a:t>8/11/2025</a:t>
+              <a:t>8/15/2025</a:t>
             </a:fld>
             <a:endParaRPr lang="en-US"/>
           </a:p>
@@ -13540,7 +13541,7 @@
           <a:p>
             <a:fld id="{846CE7D5-CF57-46EF-B807-FDD0502418D4}" type="datetimeFigureOut">
               <a:rPr lang="en-US" smtClean="0"/>
-              <a:t>8/11/2025</a:t>
+              <a:t>8/15/2025</a:t>
             </a:fld>
             <a:endParaRPr lang="en-US"/>
           </a:p>
@@ -31049,6 +31050,401 @@
         </p:nvSpPr>
         <p:spPr/>
         <p:txBody>
+          <a:bodyPr>
+            <a:normAutofit/>
+          </a:bodyPr>
+          <a:lstStyle/>
+          <a:p>
+            <a:r>
+              <a:rPr lang="en-US" dirty="0"/>
+              <a:t>Research Motivation for Topic Modeling</a:t>
+            </a:r>
+          </a:p>
+        </p:txBody>
+      </p:sp>
+      <p:sp>
+        <p:nvSpPr>
+          <p:cNvPr id="13" name="Content Placeholder 2">
+            <a:extLst>
+              <a:ext uri="{FF2B5EF4-FFF2-40B4-BE49-F238E27FC236}">
+                <a16:creationId xmlns:a16="http://schemas.microsoft.com/office/drawing/2014/main" id="{B059BA6D-4620-ACE5-14F4-E21092985250}"/>
+              </a:ext>
+            </a:extLst>
+          </p:cNvPr>
+          <p:cNvSpPr>
+            <a:spLocks noGrp="1" noRot="1" noMove="1" noResize="1" noEditPoints="1" noAdjustHandles="1" noChangeArrowheads="1" noChangeShapeType="1"/>
+          </p:cNvSpPr>
+          <p:nvPr>
+            <p:ph idx="1"/>
+          </p:nvPr>
+        </p:nvSpPr>
+        <p:spPr>
+          <a:xfrm>
+            <a:off x="838200" y="1143000"/>
+            <a:ext cx="10515600" cy="5117087"/>
+          </a:xfrm>
+        </p:spPr>
+        <p:txBody>
+          <a:bodyPr>
+            <a:normAutofit fontScale="92500" lnSpcReduction="10000"/>
+          </a:bodyPr>
+          <a:lstStyle/>
+          <a:p>
+            <a:pPr algn="l">
+              <a:lnSpc>
+                <a:spcPct val="110000"/>
+              </a:lnSpc>
+            </a:pPr>
+            <a:r>
+              <a:rPr lang="en-US" dirty="0"/>
+              <a:t>You have many responses from a survey, and you want to categorize the responses into (</a:t>
+            </a:r>
+            <a:r>
+              <a:rPr lang="en-US" i="1" dirty="0"/>
+              <a:t>a prior </a:t>
+            </a:r>
+            <a:r>
+              <a:rPr lang="en-US" dirty="0"/>
+              <a:t>unknown) themes and determine how often participants answered with each theme.</a:t>
+            </a:r>
+          </a:p>
+          <a:p>
+            <a:pPr algn="l">
+              <a:lnSpc>
+                <a:spcPct val="110000"/>
+              </a:lnSpc>
+            </a:pPr>
+            <a:r>
+              <a:rPr lang="en-US" dirty="0"/>
+              <a:t>You have a collection of notes about patients in your clinic who all have a particular ailment, and you want to identify common attributes that were written across all these patients.</a:t>
+            </a:r>
+          </a:p>
+          <a:p>
+            <a:pPr algn="l">
+              <a:lnSpc>
+                <a:spcPct val="110000"/>
+              </a:lnSpc>
+            </a:pPr>
+            <a:r>
+              <a:rPr lang="en-US" dirty="0"/>
+              <a:t>You want to analyze decades of telescope observation logs and other notes to identify emerging research topics and track their relevance over time.</a:t>
+            </a:r>
+          </a:p>
+          <a:p>
+            <a:pPr algn="l">
+              <a:lnSpc>
+                <a:spcPct val="110000"/>
+              </a:lnSpc>
+            </a:pPr>
+            <a:r>
+              <a:rPr lang="en-US" dirty="0"/>
+              <a:t>You have many interview transcripts and want to uncover themes in public opinion about a particular federal policy.</a:t>
+            </a:r>
+          </a:p>
+          <a:p>
+            <a:pPr algn="l">
+              <a:lnSpc>
+                <a:spcPct val="100000"/>
+              </a:lnSpc>
+            </a:pPr>
+            <a:endParaRPr lang="en-US" dirty="0"/>
+          </a:p>
+          <a:p>
+            <a:pPr>
+              <a:lnSpc>
+                <a:spcPct val="100000"/>
+              </a:lnSpc>
+            </a:pPr>
+            <a:endParaRPr lang="en-US" dirty="0"/>
+          </a:p>
+          <a:p>
+            <a:endParaRPr lang="en-US" dirty="0"/>
+          </a:p>
+        </p:txBody>
+      </p:sp>
+    </p:spTree>
+    <p:extLst>
+      <p:ext uri="{BB962C8B-B14F-4D97-AF65-F5344CB8AC3E}">
+        <p14:creationId xmlns:p14="http://schemas.microsoft.com/office/powerpoint/2010/main" val="915961459"/>
+      </p:ext>
+    </p:extLst>
+  </p:cSld>
+  <p:clrMapOvr>
+    <a:masterClrMapping/>
+  </p:clrMapOvr>
+  <p:timing>
+    <p:tnLst>
+      <p:par>
+        <p:cTn id="1" dur="indefinite" restart="never" nodeType="tmRoot">
+          <p:childTnLst>
+            <p:seq concurrent="1" nextAc="seek">
+              <p:cTn id="2" dur="indefinite" nodeType="mainSeq">
+                <p:childTnLst>
+                  <p:par>
+                    <p:cTn id="3" fill="hold">
+                      <p:stCondLst>
+                        <p:cond delay="indefinite"/>
+                      </p:stCondLst>
+                      <p:childTnLst>
+                        <p:par>
+                          <p:cTn id="4" fill="hold">
+                            <p:stCondLst>
+                              <p:cond delay="0"/>
+                            </p:stCondLst>
+                            <p:childTnLst>
+                              <p:par>
+                                <p:cTn id="5" presetID="1" presetClass="entr" presetSubtype="0" fill="hold" grpId="0" nodeType="clickEffect">
+                                  <p:stCondLst>
+                                    <p:cond delay="0"/>
+                                  </p:stCondLst>
+                                  <p:childTnLst>
+                                    <p:set>
+                                      <p:cBhvr>
+                                        <p:cTn id="6" dur="1" fill="hold">
+                                          <p:stCondLst>
+                                            <p:cond delay="0"/>
+                                          </p:stCondLst>
+                                        </p:cTn>
+                                        <p:tgtEl>
+                                          <p:spTgt spid="13">
+                                            <p:txEl>
+                                              <p:pRg st="0" end="0"/>
+                                            </p:txEl>
+                                          </p:spTgt>
+                                        </p:tgtEl>
+                                        <p:attrNameLst>
+                                          <p:attrName>style.visibility</p:attrName>
+                                        </p:attrNameLst>
+                                      </p:cBhvr>
+                                      <p:to>
+                                        <p:strVal val="visible"/>
+                                      </p:to>
+                                    </p:set>
+                                  </p:childTnLst>
+                                </p:cTn>
+                              </p:par>
+                            </p:childTnLst>
+                          </p:cTn>
+                        </p:par>
+                      </p:childTnLst>
+                    </p:cTn>
+                  </p:par>
+                  <p:par>
+                    <p:cTn id="7" fill="hold">
+                      <p:stCondLst>
+                        <p:cond delay="indefinite"/>
+                      </p:stCondLst>
+                      <p:childTnLst>
+                        <p:par>
+                          <p:cTn id="8" fill="hold">
+                            <p:stCondLst>
+                              <p:cond delay="0"/>
+                            </p:stCondLst>
+                            <p:childTnLst>
+                              <p:par>
+                                <p:cTn id="9" presetID="1" presetClass="entr" presetSubtype="0" fill="hold" grpId="0" nodeType="clickEffect">
+                                  <p:stCondLst>
+                                    <p:cond delay="0"/>
+                                  </p:stCondLst>
+                                  <p:childTnLst>
+                                    <p:set>
+                                      <p:cBhvr>
+                                        <p:cTn id="10" dur="1" fill="hold">
+                                          <p:stCondLst>
+                                            <p:cond delay="0"/>
+                                          </p:stCondLst>
+                                        </p:cTn>
+                                        <p:tgtEl>
+                                          <p:spTgt spid="13">
+                                            <p:txEl>
+                                              <p:pRg st="1" end="1"/>
+                                            </p:txEl>
+                                          </p:spTgt>
+                                        </p:tgtEl>
+                                        <p:attrNameLst>
+                                          <p:attrName>style.visibility</p:attrName>
+                                        </p:attrNameLst>
+                                      </p:cBhvr>
+                                      <p:to>
+                                        <p:strVal val="visible"/>
+                                      </p:to>
+                                    </p:set>
+                                  </p:childTnLst>
+                                </p:cTn>
+                              </p:par>
+                            </p:childTnLst>
+                          </p:cTn>
+                        </p:par>
+                      </p:childTnLst>
+                    </p:cTn>
+                  </p:par>
+                  <p:par>
+                    <p:cTn id="11" fill="hold">
+                      <p:stCondLst>
+                        <p:cond delay="indefinite"/>
+                      </p:stCondLst>
+                      <p:childTnLst>
+                        <p:par>
+                          <p:cTn id="12" fill="hold">
+                            <p:stCondLst>
+                              <p:cond delay="0"/>
+                            </p:stCondLst>
+                            <p:childTnLst>
+                              <p:par>
+                                <p:cTn id="13" presetID="1" presetClass="entr" presetSubtype="0" fill="hold" grpId="0" nodeType="clickEffect">
+                                  <p:stCondLst>
+                                    <p:cond delay="0"/>
+                                  </p:stCondLst>
+                                  <p:childTnLst>
+                                    <p:set>
+                                      <p:cBhvr>
+                                        <p:cTn id="14" dur="1" fill="hold">
+                                          <p:stCondLst>
+                                            <p:cond delay="0"/>
+                                          </p:stCondLst>
+                                        </p:cTn>
+                                        <p:tgtEl>
+                                          <p:spTgt spid="13">
+                                            <p:txEl>
+                                              <p:pRg st="2" end="2"/>
+                                            </p:txEl>
+                                          </p:spTgt>
+                                        </p:tgtEl>
+                                        <p:attrNameLst>
+                                          <p:attrName>style.visibility</p:attrName>
+                                        </p:attrNameLst>
+                                      </p:cBhvr>
+                                      <p:to>
+                                        <p:strVal val="visible"/>
+                                      </p:to>
+                                    </p:set>
+                                  </p:childTnLst>
+                                </p:cTn>
+                              </p:par>
+                            </p:childTnLst>
+                          </p:cTn>
+                        </p:par>
+                      </p:childTnLst>
+                    </p:cTn>
+                  </p:par>
+                  <p:par>
+                    <p:cTn id="15" fill="hold">
+                      <p:stCondLst>
+                        <p:cond delay="indefinite"/>
+                      </p:stCondLst>
+                      <p:childTnLst>
+                        <p:par>
+                          <p:cTn id="16" fill="hold">
+                            <p:stCondLst>
+                              <p:cond delay="0"/>
+                            </p:stCondLst>
+                            <p:childTnLst>
+                              <p:par>
+                                <p:cTn id="17" presetID="1" presetClass="entr" presetSubtype="0" fill="hold" grpId="0" nodeType="clickEffect">
+                                  <p:stCondLst>
+                                    <p:cond delay="0"/>
+                                  </p:stCondLst>
+                                  <p:childTnLst>
+                                    <p:set>
+                                      <p:cBhvr>
+                                        <p:cTn id="18" dur="1" fill="hold">
+                                          <p:stCondLst>
+                                            <p:cond delay="0"/>
+                                          </p:stCondLst>
+                                        </p:cTn>
+                                        <p:tgtEl>
+                                          <p:spTgt spid="13">
+                                            <p:txEl>
+                                              <p:pRg st="3" end="3"/>
+                                            </p:txEl>
+                                          </p:spTgt>
+                                        </p:tgtEl>
+                                        <p:attrNameLst>
+                                          <p:attrName>style.visibility</p:attrName>
+                                        </p:attrNameLst>
+                                      </p:cBhvr>
+                                      <p:to>
+                                        <p:strVal val="visible"/>
+                                      </p:to>
+                                    </p:set>
+                                  </p:childTnLst>
+                                </p:cTn>
+                              </p:par>
+                            </p:childTnLst>
+                          </p:cTn>
+                        </p:par>
+                      </p:childTnLst>
+                    </p:cTn>
+                  </p:par>
+                </p:childTnLst>
+              </p:cTn>
+              <p:prevCondLst>
+                <p:cond evt="onPrev" delay="0">
+                  <p:tgtEl>
+                    <p:sldTgt/>
+                  </p:tgtEl>
+                </p:cond>
+              </p:prevCondLst>
+              <p:nextCondLst>
+                <p:cond evt="onNext" delay="0">
+                  <p:tgtEl>
+                    <p:sldTgt/>
+                  </p:tgtEl>
+                </p:cond>
+              </p:nextCondLst>
+            </p:seq>
+          </p:childTnLst>
+        </p:cTn>
+      </p:par>
+    </p:tnLst>
+    <p:bldLst>
+      <p:bldP spid="13" grpId="0" build="p"/>
+    </p:bldLst>
+  </p:timing>
+</p:sld>
+</file>
+
+<file path=ppt/slides/slide18.xml><?xml version="1.0" encoding="utf-8"?>
+<p:sld xmlns:a="http://schemas.openxmlformats.org/drawingml/2006/main" xmlns:r="http://schemas.openxmlformats.org/officeDocument/2006/relationships" xmlns:p="http://schemas.openxmlformats.org/presentationml/2006/main">
+  <p:cSld>
+    <p:spTree>
+      <p:nvGrpSpPr>
+        <p:cNvPr id="1" name="">
+          <a:extLst>
+            <a:ext uri="{FF2B5EF4-FFF2-40B4-BE49-F238E27FC236}">
+              <a16:creationId xmlns:a16="http://schemas.microsoft.com/office/drawing/2014/main" id="{637FD6BD-FA2B-0137-DD7E-AB214E9E0675}"/>
+            </a:ext>
+          </a:extLst>
+        </p:cNvPr>
+        <p:cNvGrpSpPr/>
+        <p:nvPr/>
+      </p:nvGrpSpPr>
+      <p:grpSpPr>
+        <a:xfrm>
+          <a:off x="0" y="0"/>
+          <a:ext cx="0" cy="0"/>
+          <a:chOff x="0" y="0"/>
+          <a:chExt cx="0" cy="0"/>
+        </a:xfrm>
+      </p:grpSpPr>
+      <p:sp>
+        <p:nvSpPr>
+          <p:cNvPr id="2" name="Title 1">
+            <a:extLst>
+              <a:ext uri="{FF2B5EF4-FFF2-40B4-BE49-F238E27FC236}">
+                <a16:creationId xmlns:a16="http://schemas.microsoft.com/office/drawing/2014/main" id="{2D5F1B39-9F09-784C-6487-A89074407218}"/>
+              </a:ext>
+            </a:extLst>
+          </p:cNvPr>
+          <p:cNvSpPr>
+            <a:spLocks noGrp="1"/>
+          </p:cNvSpPr>
+          <p:nvPr>
+            <p:ph type="title"/>
+          </p:nvPr>
+        </p:nvSpPr>
+        <p:spPr/>
+        <p:txBody>
           <a:bodyPr/>
           <a:lstStyle/>
           <a:p>
@@ -31064,7 +31460,7 @@
           <p:cNvPr id="8" name="Group 7">
             <a:extLst>
               <a:ext uri="{FF2B5EF4-FFF2-40B4-BE49-F238E27FC236}">
-                <a16:creationId xmlns:a16="http://schemas.microsoft.com/office/drawing/2014/main" id="{616142AE-4BB9-6020-4B71-94D32B72083B}"/>
+                <a16:creationId xmlns:a16="http://schemas.microsoft.com/office/drawing/2014/main" id="{524AB466-0F7C-A8A3-6B7F-FBCBEEF965F4}"/>
               </a:ext>
             </a:extLst>
           </p:cNvPr>
@@ -31084,7 +31480,7 @@
             <p:cNvPr id="9" name="Group 8">
               <a:extLst>
                 <a:ext uri="{FF2B5EF4-FFF2-40B4-BE49-F238E27FC236}">
-                  <a16:creationId xmlns:a16="http://schemas.microsoft.com/office/drawing/2014/main" id="{A061562F-96DC-1617-5A00-096B48E2E52C}"/>
+                  <a16:creationId xmlns:a16="http://schemas.microsoft.com/office/drawing/2014/main" id="{EA9492F4-0EA2-CB2E-03DA-047C382F2DBA}"/>
                 </a:ext>
               </a:extLst>
             </p:cNvPr>
@@ -31104,7 +31500,7 @@
               <p:cNvPr id="11" name="Rectangle 10">
                 <a:extLst>
                   <a:ext uri="{FF2B5EF4-FFF2-40B4-BE49-F238E27FC236}">
-                    <a16:creationId xmlns:a16="http://schemas.microsoft.com/office/drawing/2014/main" id="{691D9A3B-CF95-F0F8-A415-26E1ED1DDE54}"/>
+                    <a16:creationId xmlns:a16="http://schemas.microsoft.com/office/drawing/2014/main" id="{8AC5E4F7-DC03-A5EF-A5F3-597416D0340D}"/>
                   </a:ext>
                 </a:extLst>
               </p:cNvPr>
@@ -31156,7 +31552,7 @@
               <p:cNvPr id="12" name="Rectangle: Rounded Corners 11">
                 <a:extLst>
                   <a:ext uri="{FF2B5EF4-FFF2-40B4-BE49-F238E27FC236}">
-                    <a16:creationId xmlns:a16="http://schemas.microsoft.com/office/drawing/2014/main" id="{E234021F-B235-00EB-D6DC-05CF8E05B15A}"/>
+                    <a16:creationId xmlns:a16="http://schemas.microsoft.com/office/drawing/2014/main" id="{8772B20A-DF52-1BB0-5D83-CF89DE412EB5}"/>
                   </a:ext>
                 </a:extLst>
               </p:cNvPr>
@@ -31217,7 +31613,7 @@
             <p:cNvPr id="10" name="TextBox 9">
               <a:extLst>
                 <a:ext uri="{FF2B5EF4-FFF2-40B4-BE49-F238E27FC236}">
-                  <a16:creationId xmlns:a16="http://schemas.microsoft.com/office/drawing/2014/main" id="{81FFD619-6FEB-CAA2-D661-CA91100EFEBA}"/>
+                  <a16:creationId xmlns:a16="http://schemas.microsoft.com/office/drawing/2014/main" id="{F137C420-BB0F-C6A0-B9D3-9BE42B34B123}"/>
                 </a:ext>
               </a:extLst>
             </p:cNvPr>
@@ -31298,7 +31694,7 @@
           <p:cNvPr id="3" name="Group 2">
             <a:extLst>
               <a:ext uri="{FF2B5EF4-FFF2-40B4-BE49-F238E27FC236}">
-                <a16:creationId xmlns:a16="http://schemas.microsoft.com/office/drawing/2014/main" id="{6F6D2150-126B-854E-6715-A141978D08C8}"/>
+                <a16:creationId xmlns:a16="http://schemas.microsoft.com/office/drawing/2014/main" id="{C9AB8E2E-69C7-9218-3C90-4F96CAE331A2}"/>
               </a:ext>
             </a:extLst>
           </p:cNvPr>
@@ -31318,7 +31714,7 @@
             <p:cNvPr id="4" name="Group 3">
               <a:extLst>
                 <a:ext uri="{FF2B5EF4-FFF2-40B4-BE49-F238E27FC236}">
-                  <a16:creationId xmlns:a16="http://schemas.microsoft.com/office/drawing/2014/main" id="{DD536251-29B4-9C04-F28D-DE22679DEDA8}"/>
+                  <a16:creationId xmlns:a16="http://schemas.microsoft.com/office/drawing/2014/main" id="{F134B8D6-BC0D-1947-6497-FBC3A193F6D9}"/>
                 </a:ext>
               </a:extLst>
             </p:cNvPr>
@@ -31338,7 +31734,7 @@
               <p:cNvPr id="6" name="Rectangle 5">
                 <a:extLst>
                   <a:ext uri="{FF2B5EF4-FFF2-40B4-BE49-F238E27FC236}">
-                    <a16:creationId xmlns:a16="http://schemas.microsoft.com/office/drawing/2014/main" id="{EAC8D9AA-24F3-2799-24B5-FC043A5456C5}"/>
+                    <a16:creationId xmlns:a16="http://schemas.microsoft.com/office/drawing/2014/main" id="{9A2C6B32-B8D6-5512-ECFE-3FDC6542994A}"/>
                   </a:ext>
                 </a:extLst>
               </p:cNvPr>
@@ -31390,7 +31786,7 @@
               <p:cNvPr id="7" name="Rectangle: Rounded Corners 6">
                 <a:extLst>
                   <a:ext uri="{FF2B5EF4-FFF2-40B4-BE49-F238E27FC236}">
-                    <a16:creationId xmlns:a16="http://schemas.microsoft.com/office/drawing/2014/main" id="{4B200792-AB29-CE8A-E73D-1A1C61CF52D7}"/>
+                    <a16:creationId xmlns:a16="http://schemas.microsoft.com/office/drawing/2014/main" id="{A6149A49-2738-EE07-5487-A56154F0F0AB}"/>
                   </a:ext>
                 </a:extLst>
               </p:cNvPr>
@@ -31451,7 +31847,7 @@
             <p:cNvPr id="5" name="TextBox 4">
               <a:extLst>
                 <a:ext uri="{FF2B5EF4-FFF2-40B4-BE49-F238E27FC236}">
-                  <a16:creationId xmlns:a16="http://schemas.microsoft.com/office/drawing/2014/main" id="{65D38F58-127E-BDDF-0F2D-0A89543902B6}"/>
+                  <a16:creationId xmlns:a16="http://schemas.microsoft.com/office/drawing/2014/main" id="{200098AE-464A-3C6F-C164-EA91FAA405E1}"/>
                 </a:ext>
               </a:extLst>
             </p:cNvPr>
@@ -31528,7 +31924,7 @@
           <p:cNvPr id="24" name="Group 23">
             <a:extLst>
               <a:ext uri="{FF2B5EF4-FFF2-40B4-BE49-F238E27FC236}">
-                <a16:creationId xmlns:a16="http://schemas.microsoft.com/office/drawing/2014/main" id="{3883DB96-C4DB-7896-D951-943B40323F18}"/>
+                <a16:creationId xmlns:a16="http://schemas.microsoft.com/office/drawing/2014/main" id="{25F57830-11AC-6F1C-5F21-72EE8BFD101B}"/>
               </a:ext>
             </a:extLst>
           </p:cNvPr>
@@ -31548,7 +31944,7 @@
             <p:cNvPr id="25" name="Group 24">
               <a:extLst>
                 <a:ext uri="{FF2B5EF4-FFF2-40B4-BE49-F238E27FC236}">
-                  <a16:creationId xmlns:a16="http://schemas.microsoft.com/office/drawing/2014/main" id="{DED0E815-5D96-74B1-A8BE-2FA804A4202B}"/>
+                  <a16:creationId xmlns:a16="http://schemas.microsoft.com/office/drawing/2014/main" id="{7818150C-DC6E-2107-8335-A49D44ECCD4A}"/>
                 </a:ext>
               </a:extLst>
             </p:cNvPr>
@@ -31568,7 +31964,7 @@
               <p:cNvPr id="27" name="Rectangle 26">
                 <a:extLst>
                   <a:ext uri="{FF2B5EF4-FFF2-40B4-BE49-F238E27FC236}">
-                    <a16:creationId xmlns:a16="http://schemas.microsoft.com/office/drawing/2014/main" id="{32F5A146-847C-5A58-6A15-F47A7E25CAE9}"/>
+                    <a16:creationId xmlns:a16="http://schemas.microsoft.com/office/drawing/2014/main" id="{E938E500-0801-0519-FEB3-2C9237617EAF}"/>
                   </a:ext>
                 </a:extLst>
               </p:cNvPr>
@@ -31620,7 +32016,7 @@
               <p:cNvPr id="28" name="Rectangle: Rounded Corners 27">
                 <a:extLst>
                   <a:ext uri="{FF2B5EF4-FFF2-40B4-BE49-F238E27FC236}">
-                    <a16:creationId xmlns:a16="http://schemas.microsoft.com/office/drawing/2014/main" id="{6ACCB44C-A2A5-C478-4334-FC10268093F5}"/>
+                    <a16:creationId xmlns:a16="http://schemas.microsoft.com/office/drawing/2014/main" id="{D95469D1-6556-77B2-2A73-B811143D4795}"/>
                   </a:ext>
                 </a:extLst>
               </p:cNvPr>
@@ -31681,7 +32077,7 @@
             <p:cNvPr id="26" name="TextBox 25">
               <a:extLst>
                 <a:ext uri="{FF2B5EF4-FFF2-40B4-BE49-F238E27FC236}">
-                  <a16:creationId xmlns:a16="http://schemas.microsoft.com/office/drawing/2014/main" id="{C73A959E-CC64-CD23-5B69-F40774C94FF0}"/>
+                  <a16:creationId xmlns:a16="http://schemas.microsoft.com/office/drawing/2014/main" id="{49F84D20-553E-2C99-5B0C-8A3A0286EEC3}"/>
                 </a:ext>
               </a:extLst>
             </p:cNvPr>
@@ -31756,7 +32152,7 @@
     </p:spTree>
     <p:extLst>
       <p:ext uri="{BB962C8B-B14F-4D97-AF65-F5344CB8AC3E}">
-        <p14:creationId xmlns:p14="http://schemas.microsoft.com/office/powerpoint/2010/main" val="915961459"/>
+        <p14:creationId xmlns:p14="http://schemas.microsoft.com/office/powerpoint/2010/main" val="1944323983"/>
       </p:ext>
     </p:extLst>
   </p:cSld>
@@ -31931,7 +32327,7 @@
 </p:sld>
 </file>
 
-<file path=ppt/slides/slide18.xml><?xml version="1.0" encoding="utf-8"?>
+<file path=ppt/slides/slide19.xml><?xml version="1.0" encoding="utf-8"?>
 <p:sld xmlns:a="http://schemas.openxmlformats.org/drawingml/2006/main" xmlns:r="http://schemas.openxmlformats.org/officeDocument/2006/relationships" xmlns:p="http://schemas.openxmlformats.org/presentationml/2006/main">
   <p:cSld>
     <p:spTree>
@@ -31948,150 +32344,6 @@
           <a:chExt cx="0" cy="0"/>
         </a:xfrm>
       </p:grpSpPr>
-      <p:grpSp>
-        <p:nvGrpSpPr>
-          <p:cNvPr id="9" name="Group 8">
-            <a:extLst>
-              <a:ext uri="{FF2B5EF4-FFF2-40B4-BE49-F238E27FC236}">
-                <a16:creationId xmlns:a16="http://schemas.microsoft.com/office/drawing/2014/main" id="{96BBF66F-2DD0-B96C-E2AC-06F95625F7CF}"/>
-              </a:ext>
-            </a:extLst>
-          </p:cNvPr>
-          <p:cNvGrpSpPr/>
-          <p:nvPr/>
-        </p:nvGrpSpPr>
-        <p:grpSpPr>
-          <a:xfrm>
-            <a:off x="209589" y="1656012"/>
-            <a:ext cx="5412685" cy="4496210"/>
-            <a:chOff x="209589" y="1656012"/>
-            <a:chExt cx="5412685" cy="4496210"/>
-          </a:xfrm>
-        </p:grpSpPr>
-        <p:sp>
-          <p:nvSpPr>
-            <p:cNvPr id="4" name="Rectangle 3">
-              <a:extLst>
-                <a:ext uri="{FF2B5EF4-FFF2-40B4-BE49-F238E27FC236}">
-                  <a16:creationId xmlns:a16="http://schemas.microsoft.com/office/drawing/2014/main" id="{AE234348-8111-0651-11A3-601DBD7D8322}"/>
-                </a:ext>
-              </a:extLst>
-            </p:cNvPr>
-            <p:cNvSpPr/>
-            <p:nvPr/>
-          </p:nvSpPr>
-          <p:spPr>
-            <a:xfrm>
-              <a:off x="209589" y="1953192"/>
-              <a:ext cx="5412685" cy="4199030"/>
-            </a:xfrm>
-            <a:prstGeom prst="rect">
-              <a:avLst/>
-            </a:prstGeom>
-            <a:solidFill>
-              <a:schemeClr val="accent6">
-                <a:lumMod val="20000"/>
-                <a:lumOff val="80000"/>
-              </a:schemeClr>
-            </a:solidFill>
-            <a:ln w="38100">
-              <a:solidFill>
-                <a:schemeClr val="accent6">
-                  <a:lumMod val="75000"/>
-                </a:schemeClr>
-              </a:solidFill>
-            </a:ln>
-          </p:spPr>
-          <p:style>
-            <a:lnRef idx="2">
-              <a:schemeClr val="accent1">
-                <a:shade val="15000"/>
-              </a:schemeClr>
-            </a:lnRef>
-            <a:fillRef idx="1">
-              <a:schemeClr val="accent1"/>
-            </a:fillRef>
-            <a:effectRef idx="0">
-              <a:schemeClr val="accent1"/>
-            </a:effectRef>
-            <a:fontRef idx="minor">
-              <a:schemeClr val="lt1"/>
-            </a:fontRef>
-          </p:style>
-          <p:txBody>
-            <a:bodyPr rtlCol="0" anchor="ctr"/>
-            <a:lstStyle/>
-            <a:p>
-              <a:pPr algn="ctr"/>
-              <a:endParaRPr lang="en-US"/>
-            </a:p>
-          </p:txBody>
-        </p:sp>
-        <p:sp>
-          <p:nvSpPr>
-            <p:cNvPr id="5" name="Rectangle: Rounded Corners 4">
-              <a:extLst>
-                <a:ext uri="{FF2B5EF4-FFF2-40B4-BE49-F238E27FC236}">
-                  <a16:creationId xmlns:a16="http://schemas.microsoft.com/office/drawing/2014/main" id="{F603A502-80ED-5F9F-407F-56B0D7CA09C3}"/>
-                </a:ext>
-              </a:extLst>
-            </p:cNvPr>
-            <p:cNvSpPr/>
-            <p:nvPr/>
-          </p:nvSpPr>
-          <p:spPr>
-            <a:xfrm>
-              <a:off x="440238" y="1656012"/>
-              <a:ext cx="4951386" cy="594360"/>
-            </a:xfrm>
-            <a:prstGeom prst="roundRect">
-              <a:avLst/>
-            </a:prstGeom>
-            <a:solidFill>
-              <a:schemeClr val="accent6">
-                <a:lumMod val="40000"/>
-                <a:lumOff val="60000"/>
-              </a:schemeClr>
-            </a:solidFill>
-            <a:ln w="38100">
-              <a:solidFill>
-                <a:schemeClr val="bg1"/>
-              </a:solidFill>
-            </a:ln>
-          </p:spPr>
-          <p:style>
-            <a:lnRef idx="2">
-              <a:schemeClr val="accent1">
-                <a:shade val="15000"/>
-              </a:schemeClr>
-            </a:lnRef>
-            <a:fillRef idx="1">
-              <a:schemeClr val="accent1"/>
-            </a:fillRef>
-            <a:effectRef idx="0">
-              <a:schemeClr val="accent1"/>
-            </a:effectRef>
-            <a:fontRef idx="minor">
-              <a:schemeClr val="lt1"/>
-            </a:fontRef>
-          </p:style>
-          <p:txBody>
-            <a:bodyPr rtlCol="0" anchor="ctr"/>
-            <a:lstStyle/>
-            <a:p>
-              <a:pPr algn="ctr"/>
-              <a:r>
-                <a:rPr lang="en-US" sz="2800">
-                  <a:solidFill>
-                    <a:schemeClr val="tx1"/>
-                  </a:solidFill>
-                </a:rPr>
-                <a:t>BERTopic</a:t>
-              </a:r>
-            </a:p>
-          </p:txBody>
-        </p:sp>
-      </p:grpSp>
       <p:sp>
         <p:nvSpPr>
           <p:cNvPr id="2" name="Title 1">
@@ -32120,75 +32372,6 @@
           </a:p>
         </p:txBody>
       </p:sp>
-      <p:sp>
-        <p:nvSpPr>
-          <p:cNvPr id="3" name="Content Placeholder 2">
-            <a:extLst>
-              <a:ext uri="{FF2B5EF4-FFF2-40B4-BE49-F238E27FC236}">
-                <a16:creationId xmlns:a16="http://schemas.microsoft.com/office/drawing/2014/main" id="{71F698CF-4E30-ADE1-F965-736F46712AD6}"/>
-              </a:ext>
-            </a:extLst>
-          </p:cNvPr>
-          <p:cNvSpPr>
-            <a:spLocks noGrp="1"/>
-          </p:cNvSpPr>
-          <p:nvPr>
-            <p:ph idx="1"/>
-          </p:nvPr>
-        </p:nvSpPr>
-        <p:spPr>
-          <a:xfrm>
-            <a:off x="291156" y="2293217"/>
-            <a:ext cx="5100468" cy="3681455"/>
-          </a:xfrm>
-        </p:spPr>
-        <p:txBody>
-          <a:bodyPr vert="horz" lIns="91440" tIns="45720" rIns="91440" bIns="45720" rtlCol="0" anchor="t">
-            <a:normAutofit/>
-          </a:bodyPr>
-          <a:lstStyle/>
-          <a:p>
-            <a:pPr marL="457200" indent="-457200" algn="l">
-              <a:buFont typeface="+mj-lt"/>
-              <a:buAutoNum type="arabicPeriod"/>
-            </a:pPr>
-            <a:r>
-              <a:rPr lang="en-US" sz="2400" dirty="0"/>
-              <a:t>Convert sentences and/or documents into vectors using a transformer (embedding)</a:t>
-            </a:r>
-          </a:p>
-          <a:p>
-            <a:pPr marL="457200" indent="-457200" algn="l">
-              <a:buFont typeface="+mj-lt"/>
-              <a:buAutoNum type="arabicPeriod"/>
-            </a:pPr>
-            <a:r>
-              <a:rPr lang="en-US" sz="2400" dirty="0"/>
-              <a:t>Dimension reduction (e.g., UMAP)</a:t>
-            </a:r>
-          </a:p>
-          <a:p>
-            <a:pPr marL="457200" indent="-457200" algn="l">
-              <a:buFont typeface="+mj-lt"/>
-              <a:buAutoNum type="arabicPeriod"/>
-            </a:pPr>
-            <a:r>
-              <a:rPr lang="en-US" sz="2400" dirty="0"/>
-              <a:t>Clustering (e.g., HDBSCAN,          k-means) to identify “topics”</a:t>
-            </a:r>
-          </a:p>
-          <a:p>
-            <a:pPr marL="457200" indent="-457200" algn="l">
-              <a:buFont typeface="+mj-lt"/>
-              <a:buAutoNum type="arabicPeriod"/>
-            </a:pPr>
-            <a:r>
-              <a:rPr lang="en-US" sz="2400" dirty="0"/>
-              <a:t>Generate a label for each topic (e.g., using an extension of TF-IDF)</a:t>
-            </a:r>
-          </a:p>
-        </p:txBody>
-      </p:sp>
       <p:grpSp>
         <p:nvGrpSpPr>
           <p:cNvPr id="10" name="Group 9">
@@ -32203,7 +32386,7 @@
         </p:nvGrpSpPr>
         <p:grpSpPr>
           <a:xfrm>
-            <a:off x="6488159" y="1656012"/>
+            <a:off x="342546" y="1667587"/>
             <a:ext cx="5412685" cy="4496210"/>
             <a:chOff x="6488159" y="1656012"/>
             <a:chExt cx="5412685" cy="4496210"/>
@@ -32462,26 +32645,41 @@
             <a:p>
               <a:pPr algn="l"/>
               <a:r>
-                <a:rPr lang="en-US" sz="2400"/>
-                <a:t>If context window is large enough, could feed entire set of documents into LLM (e.g., Gemini) and ask for topics in prompt</a:t>
+                <a:rPr lang="en-US" sz="2400" dirty="0"/>
+                <a:t>If context window (LLM memory) is large enough, could feed entire set of documents into LLM and ask for topics in prompt</a:t>
               </a:r>
             </a:p>
             <a:p>
               <a:pPr algn="l"/>
               <a:r>
-                <a:rPr lang="en-US" sz="2400"/>
-                <a:t>Could combine with BERTopic (or similar) and use LLM to label clusters</a:t>
+                <a:rPr lang="en-US" sz="2400" dirty="0"/>
+                <a:t>Could combine with “classical” method to use LLM to label clusters</a:t>
               </a:r>
             </a:p>
             <a:p>
               <a:pPr algn="l"/>
               <a:r>
-                <a:rPr lang="en-US" sz="2400"/>
+                <a:rPr lang="en-US" sz="2400" dirty="0"/>
                 <a:t>If using LLM, there may be </a:t>
               </a:r>
               <a:r>
-                <a:rPr lang="en-US" sz="2400" b="1"/>
+                <a:rPr lang="en-US" sz="2400" b="1" dirty="0"/>
                 <a:t>privacy concerns</a:t>
+              </a:r>
+            </a:p>
+            <a:p>
+              <a:pPr algn="l"/>
+              <a:r>
+                <a:rPr lang="en-US" sz="2400" dirty="0"/>
+                <a:t>Can you </a:t>
+              </a:r>
+              <a:r>
+                <a:rPr lang="en-US" sz="2400" b="1" dirty="0"/>
+                <a:t>verify/repeat </a:t>
+              </a:r>
+              <a:r>
+                <a:rPr lang="en-US" sz="2400" dirty="0"/>
+                <a:t>the results?</a:t>
               </a:r>
             </a:p>
           </p:txBody>
@@ -32551,6 +32749,243 @@
           </p:txBody>
         </p:sp>
       </p:grpSp>
+      <p:grpSp>
+        <p:nvGrpSpPr>
+          <p:cNvPr id="17" name="Group 16">
+            <a:extLst>
+              <a:ext uri="{FF2B5EF4-FFF2-40B4-BE49-F238E27FC236}">
+                <a16:creationId xmlns:a16="http://schemas.microsoft.com/office/drawing/2014/main" id="{0CC2DE56-EC26-3468-810E-C5D352A6DCD8}"/>
+              </a:ext>
+            </a:extLst>
+          </p:cNvPr>
+          <p:cNvGrpSpPr/>
+          <p:nvPr/>
+        </p:nvGrpSpPr>
+        <p:grpSpPr>
+          <a:xfrm>
+            <a:off x="6436769" y="1667587"/>
+            <a:ext cx="5412685" cy="4496210"/>
+            <a:chOff x="6436769" y="1667587"/>
+            <a:chExt cx="5412685" cy="4496210"/>
+          </a:xfrm>
+        </p:grpSpPr>
+        <p:grpSp>
+          <p:nvGrpSpPr>
+            <p:cNvPr id="14" name="Group 13">
+              <a:extLst>
+                <a:ext uri="{FF2B5EF4-FFF2-40B4-BE49-F238E27FC236}">
+                  <a16:creationId xmlns:a16="http://schemas.microsoft.com/office/drawing/2014/main" id="{56A5A917-BE0F-632B-0CEC-EFB1093FFA51}"/>
+                </a:ext>
+              </a:extLst>
+            </p:cNvPr>
+            <p:cNvGrpSpPr/>
+            <p:nvPr/>
+          </p:nvGrpSpPr>
+          <p:grpSpPr>
+            <a:xfrm>
+              <a:off x="6436769" y="1964767"/>
+              <a:ext cx="5412685" cy="4199030"/>
+              <a:chOff x="6436769" y="1964767"/>
+              <a:chExt cx="5412685" cy="4199030"/>
+            </a:xfrm>
+          </p:grpSpPr>
+          <p:sp>
+            <p:nvSpPr>
+              <p:cNvPr id="4" name="Rectangle 3">
+                <a:extLst>
+                  <a:ext uri="{FF2B5EF4-FFF2-40B4-BE49-F238E27FC236}">
+                    <a16:creationId xmlns:a16="http://schemas.microsoft.com/office/drawing/2014/main" id="{AE234348-8111-0651-11A3-601DBD7D8322}"/>
+                  </a:ext>
+                </a:extLst>
+              </p:cNvPr>
+              <p:cNvSpPr/>
+              <p:nvPr/>
+            </p:nvSpPr>
+            <p:spPr>
+              <a:xfrm>
+                <a:off x="6436769" y="1964767"/>
+                <a:ext cx="5412685" cy="4199030"/>
+              </a:xfrm>
+              <a:prstGeom prst="rect">
+                <a:avLst/>
+              </a:prstGeom>
+              <a:solidFill>
+                <a:schemeClr val="accent6">
+                  <a:lumMod val="20000"/>
+                  <a:lumOff val="80000"/>
+                </a:schemeClr>
+              </a:solidFill>
+              <a:ln w="38100">
+                <a:solidFill>
+                  <a:schemeClr val="accent6">
+                    <a:lumMod val="75000"/>
+                  </a:schemeClr>
+                </a:solidFill>
+              </a:ln>
+            </p:spPr>
+            <p:style>
+              <a:lnRef idx="2">
+                <a:schemeClr val="accent1">
+                  <a:shade val="15000"/>
+                </a:schemeClr>
+              </a:lnRef>
+              <a:fillRef idx="1">
+                <a:schemeClr val="accent1"/>
+              </a:fillRef>
+              <a:effectRef idx="0">
+                <a:schemeClr val="accent1"/>
+              </a:effectRef>
+              <a:fontRef idx="minor">
+                <a:schemeClr val="lt1"/>
+              </a:fontRef>
+            </p:style>
+            <p:txBody>
+              <a:bodyPr rtlCol="0" anchor="ctr"/>
+              <a:lstStyle/>
+              <a:p>
+                <a:pPr algn="ctr"/>
+                <a:endParaRPr lang="en-US"/>
+              </a:p>
+            </p:txBody>
+          </p:sp>
+          <p:sp>
+            <p:nvSpPr>
+              <p:cNvPr id="13" name="TextBox 12">
+                <a:extLst>
+                  <a:ext uri="{FF2B5EF4-FFF2-40B4-BE49-F238E27FC236}">
+                    <a16:creationId xmlns:a16="http://schemas.microsoft.com/office/drawing/2014/main" id="{C26CA039-983F-78EE-DEF8-18644C5E54CD}"/>
+                  </a:ext>
+                </a:extLst>
+              </p:cNvPr>
+              <p:cNvSpPr txBox="1"/>
+              <p:nvPr/>
+            </p:nvSpPr>
+            <p:spPr>
+              <a:xfrm>
+                <a:off x="6544594" y="2492414"/>
+                <a:ext cx="5197033" cy="3323987"/>
+              </a:xfrm>
+              <a:prstGeom prst="rect">
+                <a:avLst/>
+              </a:prstGeom>
+              <a:noFill/>
+            </p:spPr>
+            <p:txBody>
+              <a:bodyPr wrap="square" rtlCol="0">
+                <a:spAutoFit/>
+              </a:bodyPr>
+              <a:lstStyle/>
+              <a:p>
+                <a:pPr marL="457200" indent="-457200">
+                  <a:buFont typeface="+mj-lt"/>
+                  <a:buAutoNum type="arabicPeriod"/>
+                </a:pPr>
+                <a:r>
+                  <a:rPr lang="en-US" sz="2400" dirty="0"/>
+                  <a:t>Convert sentences and/or documents into vectors using a transformer (embedding)</a:t>
+                </a:r>
+              </a:p>
+              <a:p>
+                <a:pPr marL="457200" indent="-457200">
+                  <a:buFont typeface="+mj-lt"/>
+                  <a:buAutoNum type="arabicPeriod"/>
+                </a:pPr>
+                <a:r>
+                  <a:rPr lang="en-US" sz="2400" dirty="0"/>
+                  <a:t>Dimension reduction (e.g., UMAP)</a:t>
+                </a:r>
+              </a:p>
+              <a:p>
+                <a:pPr marL="457200" indent="-457200">
+                  <a:buFont typeface="+mj-lt"/>
+                  <a:buAutoNum type="arabicPeriod"/>
+                </a:pPr>
+                <a:r>
+                  <a:rPr lang="en-US" sz="2400" dirty="0"/>
+                  <a:t>Clustering (e.g., HDBSCAN,          k-means) to identify “topics”</a:t>
+                </a:r>
+              </a:p>
+              <a:p>
+                <a:pPr marL="457200" indent="-457200">
+                  <a:buFont typeface="+mj-lt"/>
+                  <a:buAutoNum type="arabicPeriod"/>
+                </a:pPr>
+                <a:r>
+                  <a:rPr lang="en-US" sz="2400" dirty="0"/>
+                  <a:t>Generate a label for each topic (e.g., using an extension of TF-IDF)</a:t>
+                </a:r>
+              </a:p>
+              <a:p>
+                <a:endParaRPr lang="en-US" dirty="0"/>
+              </a:p>
+            </p:txBody>
+          </p:sp>
+        </p:grpSp>
+        <p:sp>
+          <p:nvSpPr>
+            <p:cNvPr id="5" name="Rectangle: Rounded Corners 4">
+              <a:extLst>
+                <a:ext uri="{FF2B5EF4-FFF2-40B4-BE49-F238E27FC236}">
+                  <a16:creationId xmlns:a16="http://schemas.microsoft.com/office/drawing/2014/main" id="{F603A502-80ED-5F9F-407F-56B0D7CA09C3}"/>
+                </a:ext>
+              </a:extLst>
+            </p:cNvPr>
+            <p:cNvSpPr/>
+            <p:nvPr/>
+          </p:nvSpPr>
+          <p:spPr>
+            <a:xfrm>
+              <a:off x="6667418" y="1667587"/>
+              <a:ext cx="4951386" cy="594360"/>
+            </a:xfrm>
+            <a:prstGeom prst="roundRect">
+              <a:avLst/>
+            </a:prstGeom>
+            <a:solidFill>
+              <a:schemeClr val="accent6">
+                <a:lumMod val="40000"/>
+                <a:lumOff val="60000"/>
+              </a:schemeClr>
+            </a:solidFill>
+            <a:ln w="38100">
+              <a:solidFill>
+                <a:schemeClr val="bg1"/>
+              </a:solidFill>
+            </a:ln>
+          </p:spPr>
+          <p:style>
+            <a:lnRef idx="2">
+              <a:schemeClr val="accent1">
+                <a:shade val="15000"/>
+              </a:schemeClr>
+            </a:lnRef>
+            <a:fillRef idx="1">
+              <a:schemeClr val="accent1"/>
+            </a:fillRef>
+            <a:effectRef idx="0">
+              <a:schemeClr val="accent1"/>
+            </a:effectRef>
+            <a:fontRef idx="minor">
+              <a:schemeClr val="lt1"/>
+            </a:fontRef>
+          </p:style>
+          <p:txBody>
+            <a:bodyPr rtlCol="0" anchor="ctr"/>
+            <a:lstStyle/>
+            <a:p>
+              <a:pPr algn="ctr"/>
+              <a:r>
+                <a:rPr lang="en-US" sz="2800">
+                  <a:solidFill>
+                    <a:schemeClr val="tx1"/>
+                  </a:solidFill>
+                </a:rPr>
+                <a:t>BERTopic</a:t>
+              </a:r>
+            </a:p>
+          </p:txBody>
+        </p:sp>
+      </p:grpSp>
     </p:spTree>
     <p:extLst>
       <p:ext uri="{BB962C8B-B14F-4D97-AF65-F5344CB8AC3E}">
@@ -32595,7 +33030,7 @@
                                           </p:stCondLst>
                                         </p:cTn>
                                         <p:tgtEl>
-                                          <p:spTgt spid="9"/>
+                                          <p:spTgt spid="10"/>
                                         </p:tgtEl>
                                         <p:attrNameLst>
                                           <p:attrName>style.visibility</p:attrName>
@@ -32640,7 +33075,7 @@
                                           </p:stCondLst>
                                         </p:cTn>
                                         <p:tgtEl>
-                                          <p:spTgt spid="10"/>
+                                          <p:spTgt spid="17"/>
                                         </p:tgtEl>
                                         <p:attrNameLst>
                                           <p:attrName>style.visibility</p:attrName>
@@ -32681,226 +33116,6 @@
       </p:par>
     </p:tnLst>
   </p:timing>
-</p:sld>
-</file>
-
-<file path=ppt/slides/slide19.xml><?xml version="1.0" encoding="utf-8"?>
-<p:sld xmlns:a="http://schemas.openxmlformats.org/drawingml/2006/main" xmlns:r="http://schemas.openxmlformats.org/officeDocument/2006/relationships" xmlns:p="http://schemas.openxmlformats.org/presentationml/2006/main">
-  <p:cSld>
-    <p:spTree>
-      <p:nvGrpSpPr>
-        <p:cNvPr id="1" name=""/>
-        <p:cNvGrpSpPr/>
-        <p:nvPr/>
-      </p:nvGrpSpPr>
-      <p:grpSpPr>
-        <a:xfrm>
-          <a:off x="0" y="0"/>
-          <a:ext cx="0" cy="0"/>
-          <a:chOff x="0" y="0"/>
-          <a:chExt cx="0" cy="0"/>
-        </a:xfrm>
-      </p:grpSpPr>
-      <p:sp>
-        <p:nvSpPr>
-          <p:cNvPr id="2" name="Title 1">
-            <a:extLst>
-              <a:ext uri="{FF2B5EF4-FFF2-40B4-BE49-F238E27FC236}">
-                <a16:creationId xmlns:a16="http://schemas.microsoft.com/office/drawing/2014/main" id="{E2BA7EFB-BFC1-FE0A-855C-C06EB9AFC723}"/>
-              </a:ext>
-            </a:extLst>
-          </p:cNvPr>
-          <p:cNvSpPr>
-            <a:spLocks noGrp="1"/>
-          </p:cNvSpPr>
-          <p:nvPr>
-            <p:ph type="title"/>
-          </p:nvPr>
-        </p:nvSpPr>
-        <p:spPr>
-          <a:xfrm>
-            <a:off x="327562" y="397580"/>
-            <a:ext cx="10515600" cy="899795"/>
-          </a:xfrm>
-        </p:spPr>
-        <p:txBody>
-          <a:bodyPr/>
-          <a:lstStyle/>
-          <a:p>
-            <a:r>
-              <a:rPr lang="en-US"/>
-              <a:t>BERTopic Overview</a:t>
-            </a:r>
-          </a:p>
-        </p:txBody>
-      </p:sp>
-      <p:sp>
-        <p:nvSpPr>
-          <p:cNvPr id="3" name="Content Placeholder 2">
-            <a:extLst>
-              <a:ext uri="{FF2B5EF4-FFF2-40B4-BE49-F238E27FC236}">
-                <a16:creationId xmlns:a16="http://schemas.microsoft.com/office/drawing/2014/main" id="{35C45848-BB48-9C2F-C980-A087E5EB8304}"/>
-              </a:ext>
-            </a:extLst>
-          </p:cNvPr>
-          <p:cNvSpPr>
-            <a:spLocks noGrp="1"/>
-          </p:cNvSpPr>
-          <p:nvPr>
-            <p:ph idx="1"/>
-          </p:nvPr>
-        </p:nvSpPr>
-        <p:spPr>
-          <a:xfrm>
-            <a:off x="838200" y="1995054"/>
-            <a:ext cx="10515600" cy="4265033"/>
-          </a:xfrm>
-        </p:spPr>
-        <p:txBody>
-          <a:bodyPr/>
-          <a:lstStyle/>
-          <a:p>
-            <a:pPr algn="l">
-              <a:lnSpc>
-                <a:spcPct val="100000"/>
-              </a:lnSpc>
-            </a:pPr>
-            <a:r>
-              <a:rPr lang="en-US">
-                <a:hlinkClick r:id="rId3"/>
-              </a:rPr>
-              <a:t>https://maartengr.github.io/BERTopic/index.html</a:t>
-            </a:r>
-            <a:r>
-              <a:rPr lang="en-US"/>
-              <a:t> </a:t>
-            </a:r>
-          </a:p>
-          <a:p>
-            <a:pPr algn="l">
-              <a:lnSpc>
-                <a:spcPct val="100000"/>
-              </a:lnSpc>
-            </a:pPr>
-            <a:r>
-              <a:rPr lang="en-US"/>
-              <a:t>Wraps all steps in previous slide in an easy-to-use Python library</a:t>
-            </a:r>
-          </a:p>
-          <a:p>
-            <a:pPr algn="l">
-              <a:lnSpc>
-                <a:spcPct val="100000"/>
-              </a:lnSpc>
-            </a:pPr>
-            <a:r>
-              <a:rPr lang="en-US"/>
-              <a:t>Very flexible with many different techniques (e.g., hierarchical, time-series dynamic, multimodal, etc.)</a:t>
-            </a:r>
-          </a:p>
-          <a:p>
-            <a:pPr algn="l">
-              <a:lnSpc>
-                <a:spcPct val="100000"/>
-              </a:lnSpc>
-            </a:pPr>
-            <a:r>
-              <a:rPr lang="en-US"/>
-              <a:t>Built-in visualization options</a:t>
-            </a:r>
-          </a:p>
-          <a:p>
-            <a:pPr algn="l">
-              <a:lnSpc>
-                <a:spcPct val="100000"/>
-              </a:lnSpc>
-            </a:pPr>
-            <a:r>
-              <a:rPr lang="en-US"/>
-              <a:t>Finding topics can be as simple as 1 line of code…</a:t>
-            </a:r>
-          </a:p>
-          <a:p>
-            <a:pPr algn="l">
-              <a:lnSpc>
-                <a:spcPct val="100000"/>
-              </a:lnSpc>
-            </a:pPr>
-            <a:r>
-              <a:rPr lang="en-US"/>
-              <a:t>In our experience, it usually takes a lot of hand-holding to identify reasonable topics (as is true for most methods of topic modeling)</a:t>
-            </a:r>
-          </a:p>
-          <a:p>
-            <a:pPr>
-              <a:lnSpc>
-                <a:spcPct val="100000"/>
-              </a:lnSpc>
-            </a:pPr>
-            <a:endParaRPr lang="en-US"/>
-          </a:p>
-          <a:p>
-            <a:endParaRPr lang="en-US"/>
-          </a:p>
-        </p:txBody>
-      </p:sp>
-      <p:pic>
-        <p:nvPicPr>
-          <p:cNvPr id="2050" name="Picture 2">
-            <a:extLst>
-              <a:ext uri="{FF2B5EF4-FFF2-40B4-BE49-F238E27FC236}">
-                <a16:creationId xmlns:a16="http://schemas.microsoft.com/office/drawing/2014/main" id="{80A8AE78-9F39-A40F-314E-84FC8CA75A4A}"/>
-              </a:ext>
-            </a:extLst>
-          </p:cNvPr>
-          <p:cNvPicPr>
-            <a:picLocks noChangeAspect="1" noChangeArrowheads="1"/>
-          </p:cNvPicPr>
-          <p:nvPr/>
-        </p:nvPicPr>
-        <p:blipFill>
-          <a:blip r:embed="rId4">
-            <a:extLst>
-              <a:ext uri="{28A0092B-C50C-407E-A947-70E740481C1C}">
-                <a14:useLocalDpi xmlns:a14="http://schemas.microsoft.com/office/drawing/2010/main" val="0"/>
-              </a:ext>
-            </a:extLst>
-          </a:blip>
-          <a:srcRect/>
-          <a:stretch>
-            <a:fillRect/>
-          </a:stretch>
-        </p:blipFill>
-        <p:spPr bwMode="auto">
-          <a:xfrm>
-            <a:off x="104660" y="50470"/>
-            <a:ext cx="2629640" cy="2185060"/>
-          </a:xfrm>
-          <a:prstGeom prst="rect">
-            <a:avLst/>
-          </a:prstGeom>
-          <a:noFill/>
-          <a:extLst>
-            <a:ext uri="{909E8E84-426E-40DD-AFC4-6F175D3DCCD1}">
-              <a14:hiddenFill xmlns:a14="http://schemas.microsoft.com/office/drawing/2010/main">
-                <a:solidFill>
-                  <a:srgbClr val="FFFFFF"/>
-                </a:solidFill>
-              </a14:hiddenFill>
-            </a:ext>
-          </a:extLst>
-        </p:spPr>
-      </p:pic>
-    </p:spTree>
-    <p:extLst>
-      <p:ext uri="{BB962C8B-B14F-4D97-AF65-F5344CB8AC3E}">
-        <p14:creationId xmlns:p14="http://schemas.microsoft.com/office/powerpoint/2010/main" val="1137907333"/>
-      </p:ext>
-    </p:extLst>
-  </p:cSld>
-  <p:clrMapOvr>
-    <a:masterClrMapping/>
-  </p:clrMapOvr>
 </p:sld>
 </file>
 
@@ -33582,6 +33797,226 @@
           <p:cNvPr id="2" name="Title 1">
             <a:extLst>
               <a:ext uri="{FF2B5EF4-FFF2-40B4-BE49-F238E27FC236}">
+                <a16:creationId xmlns:a16="http://schemas.microsoft.com/office/drawing/2014/main" id="{E2BA7EFB-BFC1-FE0A-855C-C06EB9AFC723}"/>
+              </a:ext>
+            </a:extLst>
+          </p:cNvPr>
+          <p:cNvSpPr>
+            <a:spLocks noGrp="1"/>
+          </p:cNvSpPr>
+          <p:nvPr>
+            <p:ph type="title"/>
+          </p:nvPr>
+        </p:nvSpPr>
+        <p:spPr>
+          <a:xfrm>
+            <a:off x="327562" y="397580"/>
+            <a:ext cx="10515600" cy="899795"/>
+          </a:xfrm>
+        </p:spPr>
+        <p:txBody>
+          <a:bodyPr/>
+          <a:lstStyle/>
+          <a:p>
+            <a:r>
+              <a:rPr lang="en-US"/>
+              <a:t>BERTopic Overview</a:t>
+            </a:r>
+          </a:p>
+        </p:txBody>
+      </p:sp>
+      <p:sp>
+        <p:nvSpPr>
+          <p:cNvPr id="3" name="Content Placeholder 2">
+            <a:extLst>
+              <a:ext uri="{FF2B5EF4-FFF2-40B4-BE49-F238E27FC236}">
+                <a16:creationId xmlns:a16="http://schemas.microsoft.com/office/drawing/2014/main" id="{35C45848-BB48-9C2F-C980-A087E5EB8304}"/>
+              </a:ext>
+            </a:extLst>
+          </p:cNvPr>
+          <p:cNvSpPr>
+            <a:spLocks noGrp="1"/>
+          </p:cNvSpPr>
+          <p:nvPr>
+            <p:ph idx="1"/>
+          </p:nvPr>
+        </p:nvSpPr>
+        <p:spPr>
+          <a:xfrm>
+            <a:off x="838200" y="1995054"/>
+            <a:ext cx="10515600" cy="4265033"/>
+          </a:xfrm>
+        </p:spPr>
+        <p:txBody>
+          <a:bodyPr/>
+          <a:lstStyle/>
+          <a:p>
+            <a:pPr algn="l">
+              <a:lnSpc>
+                <a:spcPct val="100000"/>
+              </a:lnSpc>
+            </a:pPr>
+            <a:r>
+              <a:rPr lang="en-US" dirty="0">
+                <a:hlinkClick r:id="rId3"/>
+              </a:rPr>
+              <a:t>https://maartengr.github.io/BERTopic/index.html</a:t>
+            </a:r>
+            <a:r>
+              <a:rPr lang="en-US" dirty="0"/>
+              <a:t> </a:t>
+            </a:r>
+          </a:p>
+          <a:p>
+            <a:pPr algn="l">
+              <a:lnSpc>
+                <a:spcPct val="100000"/>
+              </a:lnSpc>
+            </a:pPr>
+            <a:r>
+              <a:rPr lang="en-US" dirty="0"/>
+              <a:t>Wraps all steps in previous slide in an easy-to-use Python library</a:t>
+            </a:r>
+          </a:p>
+          <a:p>
+            <a:pPr algn="l">
+              <a:lnSpc>
+                <a:spcPct val="100000"/>
+              </a:lnSpc>
+            </a:pPr>
+            <a:r>
+              <a:rPr lang="en-US" dirty="0"/>
+              <a:t>Very flexible with many different techniques (e.g., hierarchical, time-series dynamic, multimodal, etc.)</a:t>
+            </a:r>
+          </a:p>
+          <a:p>
+            <a:pPr algn="l">
+              <a:lnSpc>
+                <a:spcPct val="100000"/>
+              </a:lnSpc>
+            </a:pPr>
+            <a:r>
+              <a:rPr lang="en-US" dirty="0"/>
+              <a:t>Built-in visualization options</a:t>
+            </a:r>
+          </a:p>
+          <a:p>
+            <a:pPr algn="l">
+              <a:lnSpc>
+                <a:spcPct val="100000"/>
+              </a:lnSpc>
+            </a:pPr>
+            <a:r>
+              <a:rPr lang="en-US" dirty="0"/>
+              <a:t>Finding topics can be as simple as 1 line of code…</a:t>
+            </a:r>
+          </a:p>
+          <a:p>
+            <a:pPr algn="l">
+              <a:lnSpc>
+                <a:spcPct val="100000"/>
+              </a:lnSpc>
+            </a:pPr>
+            <a:r>
+              <a:rPr lang="en-US" dirty="0"/>
+              <a:t>In our experience, it usually takes a lot of hand-holding to identify reasonable topics (as is true for most methods of topic modeling)</a:t>
+            </a:r>
+          </a:p>
+          <a:p>
+            <a:pPr>
+              <a:lnSpc>
+                <a:spcPct val="100000"/>
+              </a:lnSpc>
+            </a:pPr>
+            <a:endParaRPr lang="en-US" dirty="0"/>
+          </a:p>
+          <a:p>
+            <a:endParaRPr lang="en-US" dirty="0"/>
+          </a:p>
+        </p:txBody>
+      </p:sp>
+      <p:pic>
+        <p:nvPicPr>
+          <p:cNvPr id="2050" name="Picture 2">
+            <a:extLst>
+              <a:ext uri="{FF2B5EF4-FFF2-40B4-BE49-F238E27FC236}">
+                <a16:creationId xmlns:a16="http://schemas.microsoft.com/office/drawing/2014/main" id="{80A8AE78-9F39-A40F-314E-84FC8CA75A4A}"/>
+              </a:ext>
+            </a:extLst>
+          </p:cNvPr>
+          <p:cNvPicPr>
+            <a:picLocks noChangeAspect="1" noChangeArrowheads="1"/>
+          </p:cNvPicPr>
+          <p:nvPr/>
+        </p:nvPicPr>
+        <p:blipFill>
+          <a:blip r:embed="rId4">
+            <a:extLst>
+              <a:ext uri="{28A0092B-C50C-407E-A947-70E740481C1C}">
+                <a14:useLocalDpi xmlns:a14="http://schemas.microsoft.com/office/drawing/2010/main" val="0"/>
+              </a:ext>
+            </a:extLst>
+          </a:blip>
+          <a:srcRect/>
+          <a:stretch>
+            <a:fillRect/>
+          </a:stretch>
+        </p:blipFill>
+        <p:spPr bwMode="auto">
+          <a:xfrm>
+            <a:off x="104660" y="50470"/>
+            <a:ext cx="2629640" cy="2185060"/>
+          </a:xfrm>
+          <a:prstGeom prst="rect">
+            <a:avLst/>
+          </a:prstGeom>
+          <a:noFill/>
+          <a:extLst>
+            <a:ext uri="{909E8E84-426E-40DD-AFC4-6F175D3DCCD1}">
+              <a14:hiddenFill xmlns:a14="http://schemas.microsoft.com/office/drawing/2010/main">
+                <a:solidFill>
+                  <a:srgbClr val="FFFFFF"/>
+                </a:solidFill>
+              </a14:hiddenFill>
+            </a:ext>
+          </a:extLst>
+        </p:spPr>
+      </p:pic>
+    </p:spTree>
+    <p:extLst>
+      <p:ext uri="{BB962C8B-B14F-4D97-AF65-F5344CB8AC3E}">
+        <p14:creationId xmlns:p14="http://schemas.microsoft.com/office/powerpoint/2010/main" val="1137907333"/>
+      </p:ext>
+    </p:extLst>
+  </p:cSld>
+  <p:clrMapOvr>
+    <a:masterClrMapping/>
+  </p:clrMapOvr>
+</p:sld>
+</file>
+
+<file path=ppt/slides/slide21.xml><?xml version="1.0" encoding="utf-8"?>
+<p:sld xmlns:a="http://schemas.openxmlformats.org/drawingml/2006/main" xmlns:r="http://schemas.openxmlformats.org/officeDocument/2006/relationships" xmlns:p="http://schemas.openxmlformats.org/presentationml/2006/main">
+  <p:cSld>
+    <p:spTree>
+      <p:nvGrpSpPr>
+        <p:cNvPr id="1" name=""/>
+        <p:cNvGrpSpPr/>
+        <p:nvPr/>
+      </p:nvGrpSpPr>
+      <p:grpSpPr>
+        <a:xfrm>
+          <a:off x="0" y="0"/>
+          <a:ext cx="0" cy="0"/>
+          <a:chOff x="0" y="0"/>
+          <a:chExt cx="0" cy="0"/>
+        </a:xfrm>
+      </p:grpSpPr>
+      <p:sp>
+        <p:nvSpPr>
+          <p:cNvPr id="2" name="Title 1">
+            <a:extLst>
+              <a:ext uri="{FF2B5EF4-FFF2-40B4-BE49-F238E27FC236}">
                 <a16:creationId xmlns:a16="http://schemas.microsoft.com/office/drawing/2014/main" id="{80692C51-DD21-4A3B-93FC-4274A1A00B0A}"/>
               </a:ext>
             </a:extLst>
@@ -34079,7 +34514,7 @@
 </p:sld>
 </file>
 
-<file path=ppt/slides/slide21.xml><?xml version="1.0" encoding="utf-8"?>
+<file path=ppt/slides/slide22.xml><?xml version="1.0" encoding="utf-8"?>
 <p:sld xmlns:a="http://schemas.openxmlformats.org/drawingml/2006/main" xmlns:r="http://schemas.openxmlformats.org/officeDocument/2006/relationships" xmlns:p="http://schemas.openxmlformats.org/presentationml/2006/main">
   <p:cSld>
     <p:spTree>
@@ -34129,12 +34564,12 @@
           <a:lstStyle/>
           <a:p>
             <a:r>
-              <a:rPr lang="en-US" err="1"/>
+              <a:rPr lang="en-US" dirty="0" err="1"/>
               <a:t>BERTopic</a:t>
             </a:r>
             <a:r>
-              <a:rPr lang="en-US"/>
-              <a:t> Demo : Embeddings</a:t>
+              <a:rPr lang="en-US" dirty="0"/>
+              <a:t> Demo : 1. Embeddings</a:t>
             </a:r>
           </a:p>
         </p:txBody>
@@ -34610,7 +35045,7 @@
 </p:sld>
 </file>
 
-<file path=ppt/slides/slide22.xml><?xml version="1.0" encoding="utf-8"?>
+<file path=ppt/slides/slide23.xml><?xml version="1.0" encoding="utf-8"?>
 <p:sld xmlns:a="http://schemas.openxmlformats.org/drawingml/2006/main" xmlns:r="http://schemas.openxmlformats.org/officeDocument/2006/relationships" xmlns:p="http://schemas.openxmlformats.org/presentationml/2006/main">
   <p:cSld>
     <p:spTree>
@@ -34681,12 +35116,12 @@
           </a:lstStyle>
           <a:p>
             <a:r>
-              <a:rPr lang="en-US" err="1"/>
+              <a:rPr lang="en-US" dirty="0" err="1"/>
               <a:t>BERTopic</a:t>
             </a:r>
             <a:r>
-              <a:rPr lang="en-US"/>
-              <a:t> Demo : Dimension Reduction</a:t>
+              <a:rPr lang="en-US" dirty="0"/>
+              <a:t> Demo : 2. Dimension Reduction</a:t>
             </a:r>
           </a:p>
         </p:txBody>
@@ -35423,7 +35858,7 @@
 </p:sld>
 </file>
 
-<file path=ppt/slides/slide23.xml><?xml version="1.0" encoding="utf-8"?>
+<file path=ppt/slides/slide24.xml><?xml version="1.0" encoding="utf-8"?>
 <p:sld xmlns:a="http://schemas.openxmlformats.org/drawingml/2006/main" xmlns:r="http://schemas.openxmlformats.org/officeDocument/2006/relationships" xmlns:p="http://schemas.openxmlformats.org/presentationml/2006/main">
   <p:cSld>
     <p:spTree>
@@ -35473,12 +35908,12 @@
           <a:lstStyle/>
           <a:p>
             <a:r>
-              <a:rPr lang="en-US" err="1"/>
+              <a:rPr lang="en-US" dirty="0" err="1"/>
               <a:t>BERTopic</a:t>
             </a:r>
             <a:r>
-              <a:rPr lang="en-US"/>
-              <a:t> Demo : Clustering</a:t>
+              <a:rPr lang="en-US" dirty="0"/>
+              <a:t> Demo : 3. Clustering</a:t>
             </a:r>
           </a:p>
         </p:txBody>
@@ -36242,7 +36677,7 @@
 </p:sld>
 </file>
 
-<file path=ppt/slides/slide24.xml><?xml version="1.0" encoding="utf-8"?>
+<file path=ppt/slides/slide25.xml><?xml version="1.0" encoding="utf-8"?>
 <p:sld xmlns:a="http://schemas.openxmlformats.org/drawingml/2006/main" xmlns:r="http://schemas.openxmlformats.org/officeDocument/2006/relationships" xmlns:p="http://schemas.openxmlformats.org/presentationml/2006/main">
   <p:cSld>
     <p:spTree>
@@ -36318,7 +36753,7 @@
             </a:r>
             <a:r>
               <a:rPr lang="en-US" dirty="0"/>
-              <a:t> Demo : Labeling </a:t>
+              <a:t> Demo : 4. Labeling </a:t>
             </a:r>
           </a:p>
         </p:txBody>
@@ -37912,7 +38347,7 @@
 </p:sld>
 </file>
 
-<file path=ppt/slides/slide25.xml><?xml version="1.0" encoding="utf-8"?>
+<file path=ppt/slides/slide26.xml><?xml version="1.0" encoding="utf-8"?>
 <p:sld xmlns:a="http://schemas.openxmlformats.org/drawingml/2006/main" xmlns:r="http://schemas.openxmlformats.org/officeDocument/2006/relationships" xmlns:p="http://schemas.openxmlformats.org/presentationml/2006/main">
   <p:cSld>
     <p:spTree>
@@ -37988,7 +38423,7 @@
             </a:r>
             <a:r>
               <a:rPr lang="en-US" dirty="0"/>
-              <a:t> Demo : Labeling </a:t>
+              <a:t> Demo : 4. Labeling </a:t>
             </a:r>
           </a:p>
         </p:txBody>
@@ -39673,7 +40108,7 @@
 </p:sld>
 </file>
 
-<file path=ppt/slides/slide26.xml><?xml version="1.0" encoding="utf-8"?>
+<file path=ppt/slides/slide27.xml><?xml version="1.0" encoding="utf-8"?>
 <p:sld xmlns:a="http://schemas.openxmlformats.org/drawingml/2006/main" xmlns:r="http://schemas.openxmlformats.org/officeDocument/2006/relationships" xmlns:p="http://schemas.openxmlformats.org/presentationml/2006/main">
   <p:cSld>
     <p:spTree>
@@ -41313,7 +41748,7 @@
 </p:sld>
 </file>
 
-<file path=ppt/slides/slide27.xml><?xml version="1.0" encoding="utf-8"?>
+<file path=ppt/slides/slide28.xml><?xml version="1.0" encoding="utf-8"?>
 <p:sld xmlns:a="http://schemas.openxmlformats.org/drawingml/2006/main" xmlns:r="http://schemas.openxmlformats.org/officeDocument/2006/relationships" xmlns:p="http://schemas.openxmlformats.org/presentationml/2006/main">
   <p:cSld>
     <p:spTree>
@@ -43036,7 +43471,7 @@
 </p:sld>
 </file>
 
-<file path=ppt/slides/slide28.xml><?xml version="1.0" encoding="utf-8"?>
+<file path=ppt/slides/slide29.xml><?xml version="1.0" encoding="utf-8"?>
 <p:sld xmlns:a="http://schemas.openxmlformats.org/drawingml/2006/main" xmlns:r="http://schemas.openxmlformats.org/officeDocument/2006/relationships" xmlns:p="http://schemas.openxmlformats.org/presentationml/2006/main">
   <p:cSld>
     <p:spTree>
@@ -43197,7 +43632,439 @@
 </p:sld>
 </file>
 
-<file path=ppt/slides/slide29.xml><?xml version="1.0" encoding="utf-8"?>
+<file path=ppt/slides/slide3.xml><?xml version="1.0" encoding="utf-8"?>
+<p:sld xmlns:a="http://schemas.openxmlformats.org/drawingml/2006/main" xmlns:r="http://schemas.openxmlformats.org/officeDocument/2006/relationships" xmlns:p="http://schemas.openxmlformats.org/presentationml/2006/main">
+  <p:cSld>
+    <p:spTree>
+      <p:nvGrpSpPr>
+        <p:cNvPr id="1" name=""/>
+        <p:cNvGrpSpPr/>
+        <p:nvPr/>
+      </p:nvGrpSpPr>
+      <p:grpSpPr>
+        <a:xfrm>
+          <a:off x="0" y="0"/>
+          <a:ext cx="0" cy="0"/>
+          <a:chOff x="0" y="0"/>
+          <a:chExt cx="0" cy="0"/>
+        </a:xfrm>
+      </p:grpSpPr>
+      <p:sp>
+        <p:nvSpPr>
+          <p:cNvPr id="2" name="Title 1">
+            <a:extLst>
+              <a:ext uri="{FF2B5EF4-FFF2-40B4-BE49-F238E27FC236}">
+                <a16:creationId xmlns:a16="http://schemas.microsoft.com/office/drawing/2014/main" id="{525A8237-7538-F82E-CF5E-70052A370BBF}"/>
+              </a:ext>
+            </a:extLst>
+          </p:cNvPr>
+          <p:cNvSpPr>
+            <a:spLocks noGrp="1"/>
+          </p:cNvSpPr>
+          <p:nvPr>
+            <p:ph type="title"/>
+          </p:nvPr>
+        </p:nvSpPr>
+        <p:spPr/>
+        <p:txBody>
+          <a:bodyPr/>
+          <a:lstStyle/>
+          <a:p>
+            <a:r>
+              <a:rPr lang="en-US" b="1">
+                <a:solidFill>
+                  <a:srgbClr val="4E2A84"/>
+                </a:solidFill>
+              </a:rPr>
+              <a:t>This workshop is brought to you by:</a:t>
+            </a:r>
+          </a:p>
+        </p:txBody>
+      </p:sp>
+      <p:sp>
+        <p:nvSpPr>
+          <p:cNvPr id="3" name="Content Placeholder 2">
+            <a:extLst>
+              <a:ext uri="{FF2B5EF4-FFF2-40B4-BE49-F238E27FC236}">
+                <a16:creationId xmlns:a16="http://schemas.microsoft.com/office/drawing/2014/main" id="{22736DF4-919B-F686-3891-6FD730359CE9}"/>
+              </a:ext>
+            </a:extLst>
+          </p:cNvPr>
+          <p:cNvSpPr>
+            <a:spLocks noGrp="1"/>
+          </p:cNvSpPr>
+          <p:nvPr>
+            <p:ph idx="1"/>
+          </p:nvPr>
+        </p:nvSpPr>
+        <p:spPr>
+          <a:xfrm>
+            <a:off x="838200" y="2457048"/>
+            <a:ext cx="10515600" cy="4703763"/>
+          </a:xfrm>
+        </p:spPr>
+        <p:txBody>
+          <a:bodyPr vert="horz" lIns="91440" tIns="45720" rIns="91440" bIns="45720" rtlCol="0" anchor="t">
+            <a:normAutofit/>
+          </a:bodyPr>
+          <a:lstStyle/>
+          <a:p>
+            <a:pPr marL="0" indent="0" algn="ctr">
+              <a:buNone/>
+            </a:pPr>
+            <a:r>
+              <a:rPr lang="en-US" b="1"/>
+              <a:t>Need help?</a:t>
+            </a:r>
+          </a:p>
+          <a:p>
+            <a:r>
+              <a:rPr lang="en-US" sz="2400"/>
+              <a:t>AI, Machine Learning, Data Science</a:t>
+            </a:r>
+          </a:p>
+          <a:p>
+            <a:r>
+              <a:rPr lang="en-US" sz="2400"/>
+              <a:t>Statistics</a:t>
+            </a:r>
+          </a:p>
+          <a:p>
+            <a:r>
+              <a:rPr lang="en-US" sz="2400"/>
+              <a:t>Visualization</a:t>
+            </a:r>
+          </a:p>
+          <a:p>
+            <a:pPr marL="228600" marR="0" lvl="0" indent="-228600" algn="l" defTabSz="914400" rtl="0" eaLnBrk="1" fontAlgn="base" latinLnBrk="0" hangingPunct="1">
+              <a:lnSpc>
+                <a:spcPct val="90000"/>
+              </a:lnSpc>
+              <a:spcBef>
+                <a:spcPts val="1000"/>
+              </a:spcBef>
+              <a:spcAft>
+                <a:spcPts val="0"/>
+              </a:spcAft>
+              <a:buClrTx/>
+              <a:buSzTx/>
+              <a:buFont typeface="Arial" panose="020B0604020202020204" pitchFamily="34" charset="0"/>
+              <a:buChar char="•"/>
+              <a:tabLst/>
+              <a:defRPr/>
+            </a:pPr>
+            <a:r>
+              <a:rPr kumimoji="0" lang="en-US" sz="2400" b="0" i="0" u="none" strike="noStrike" kern="1200" cap="none" spc="0" normalizeH="0" baseline="0" noProof="0">
+                <a:ln>
+                  <a:noFill/>
+                </a:ln>
+                <a:solidFill>
+                  <a:prstClr val="black"/>
+                </a:solidFill>
+                <a:effectLst/>
+                <a:uLnTx/>
+                <a:uFillTx/>
+                <a:latin typeface="Aptos" panose="02110004020202020204"/>
+                <a:ea typeface="+mn-ea"/>
+                <a:cs typeface="+mn-cs"/>
+              </a:rPr>
+              <a:t>Data Collection, Cleaning​, Analysis, Management ...</a:t>
+            </a:r>
+          </a:p>
+          <a:p>
+            <a:pPr marL="228600" marR="0" lvl="0" indent="-228600" algn="l" defTabSz="914400" rtl="0" eaLnBrk="1" fontAlgn="base" latinLnBrk="0" hangingPunct="1">
+              <a:lnSpc>
+                <a:spcPct val="90000"/>
+              </a:lnSpc>
+              <a:spcBef>
+                <a:spcPts val="1000"/>
+              </a:spcBef>
+              <a:spcAft>
+                <a:spcPts val="0"/>
+              </a:spcAft>
+              <a:buClrTx/>
+              <a:buSzTx/>
+              <a:buFont typeface="Arial" panose="020B0604020202020204" pitchFamily="34" charset="0"/>
+              <a:buChar char="•"/>
+              <a:tabLst/>
+              <a:defRPr/>
+            </a:pPr>
+            <a:r>
+              <a:rPr kumimoji="0" lang="en-US" sz="2400" b="0" i="0" u="none" strike="noStrike" kern="1200" cap="none" spc="0" normalizeH="0" baseline="0" noProof="0">
+                <a:ln>
+                  <a:noFill/>
+                </a:ln>
+                <a:solidFill>
+                  <a:prstClr val="black"/>
+                </a:solidFill>
+                <a:effectLst/>
+                <a:uLnTx/>
+                <a:uFillTx/>
+                <a:latin typeface="Aptos" panose="02110004020202020204"/>
+                <a:ea typeface="+mn-ea"/>
+                <a:cs typeface="+mn-cs"/>
+              </a:rPr>
+              <a:t>Scraping, Text Analysis, Computing, Reproducibility ...</a:t>
+            </a:r>
+          </a:p>
+          <a:p>
+            <a:pPr marL="228600" marR="0" lvl="0" indent="-228600" algn="l" defTabSz="914400" rtl="0" eaLnBrk="1" fontAlgn="auto" latinLnBrk="0" hangingPunct="1">
+              <a:lnSpc>
+                <a:spcPct val="90000"/>
+              </a:lnSpc>
+              <a:spcBef>
+                <a:spcPts val="1000"/>
+              </a:spcBef>
+              <a:spcAft>
+                <a:spcPts val="0"/>
+              </a:spcAft>
+              <a:buClrTx/>
+              <a:buSzTx/>
+              <a:buFont typeface="Arial" panose="020B0604020202020204" pitchFamily="34" charset="0"/>
+              <a:buChar char="•"/>
+              <a:tabLst/>
+              <a:defRPr/>
+            </a:pPr>
+            <a:r>
+              <a:rPr kumimoji="0" lang="en-US" sz="2400" b="0" i="0" u="none" strike="noStrike" kern="1200" cap="none" spc="0" normalizeH="0" baseline="0" noProof="0">
+                <a:ln>
+                  <a:noFill/>
+                </a:ln>
+                <a:solidFill>
+                  <a:prstClr val="black"/>
+                </a:solidFill>
+                <a:effectLst/>
+                <a:uLnTx/>
+                <a:uFillTx/>
+                <a:latin typeface="Aptos" panose="02110004020202020204"/>
+                <a:ea typeface="+mn-ea"/>
+                <a:cs typeface="+mn-cs"/>
+              </a:rPr>
+              <a:t>R, Python, SQL, MATLAB, Stata, SPSS, SAS, etc.</a:t>
+            </a:r>
+            <a:endParaRPr lang="en-US"/>
+          </a:p>
+          <a:p>
+            <a:pPr marL="0" indent="0" algn="ctr">
+              <a:spcBef>
+                <a:spcPts val="3400"/>
+              </a:spcBef>
+              <a:buNone/>
+            </a:pPr>
+            <a:r>
+              <a:rPr lang="en-US" sz="2800">
+                <a:ea typeface="+mn-lt"/>
+                <a:cs typeface="+mn-lt"/>
+              </a:rPr>
+              <a:t>Request a </a:t>
+            </a:r>
+            <a:r>
+              <a:rPr lang="en-US" b="1">
+                <a:solidFill>
+                  <a:srgbClr val="00B050"/>
+                </a:solidFill>
+                <a:ea typeface="+mn-lt"/>
+                <a:cs typeface="+mn-lt"/>
+              </a:rPr>
+              <a:t>FREE</a:t>
+            </a:r>
+            <a:r>
+              <a:rPr lang="en-US">
+                <a:solidFill>
+                  <a:srgbClr val="00B050"/>
+                </a:solidFill>
+                <a:ea typeface="+mn-lt"/>
+                <a:cs typeface="+mn-lt"/>
+              </a:rPr>
+              <a:t> </a:t>
+            </a:r>
+            <a:r>
+              <a:rPr lang="en-US">
+                <a:ea typeface="+mn-lt"/>
+                <a:cs typeface="+mn-lt"/>
+              </a:rPr>
+              <a:t>consultation at</a:t>
+            </a:r>
+            <a:r>
+              <a:rPr lang="en-US" sz="2800">
+                <a:ea typeface="+mn-lt"/>
+                <a:cs typeface="+mn-lt"/>
+              </a:rPr>
+              <a:t> </a:t>
+            </a:r>
+            <a:r>
+              <a:rPr lang="en-US" sz="2800" b="1">
+                <a:solidFill>
+                  <a:srgbClr val="7030A0"/>
+                </a:solidFill>
+                <a:ea typeface="+mn-lt"/>
+                <a:cs typeface="+mn-lt"/>
+                <a:hlinkClick r:id="rId3">
+                  <a:extLst>
+                    <a:ext uri="{A12FA001-AC4F-418D-AE19-62706E023703}">
+                      <ahyp:hlinkClr xmlns:ahyp="http://schemas.microsoft.com/office/drawing/2018/hyperlinkcolor" val="tx"/>
+                    </a:ext>
+                  </a:extLst>
+                </a:hlinkClick>
+              </a:rPr>
+              <a:t>bit.ly/rcdsconsult</a:t>
+            </a:r>
+            <a:r>
+              <a:rPr lang="en-US" sz="2800">
+                <a:ea typeface="+mn-lt"/>
+                <a:cs typeface="+mn-lt"/>
+              </a:rPr>
+              <a:t>.</a:t>
+            </a:r>
+            <a:endParaRPr lang="en-US" sz="2000"/>
+          </a:p>
+        </p:txBody>
+      </p:sp>
+      <p:sp>
+        <p:nvSpPr>
+          <p:cNvPr id="6" name="Rectangle 5">
+            <a:extLst>
+              <a:ext uri="{FF2B5EF4-FFF2-40B4-BE49-F238E27FC236}">
+                <a16:creationId xmlns:a16="http://schemas.microsoft.com/office/drawing/2014/main" id="{3009FC79-E7F4-9004-8097-D165F9AA0BAE}"/>
+              </a:ext>
+            </a:extLst>
+          </p:cNvPr>
+          <p:cNvSpPr/>
+          <p:nvPr/>
+        </p:nvSpPr>
+        <p:spPr>
+          <a:xfrm>
+            <a:off x="0" y="1158166"/>
+            <a:ext cx="12192000" cy="1278973"/>
+          </a:xfrm>
+          <a:prstGeom prst="rect">
+            <a:avLst/>
+          </a:prstGeom>
+          <a:solidFill>
+            <a:srgbClr val="4E2A84"/>
+          </a:solidFill>
+          <a:ln>
+            <a:noFill/>
+          </a:ln>
+        </p:spPr>
+        <p:style>
+          <a:lnRef idx="2">
+            <a:schemeClr val="accent1">
+              <a:shade val="15000"/>
+            </a:schemeClr>
+          </a:lnRef>
+          <a:fillRef idx="1">
+            <a:schemeClr val="accent1"/>
+          </a:fillRef>
+          <a:effectRef idx="0">
+            <a:schemeClr val="accent1"/>
+          </a:effectRef>
+          <a:fontRef idx="minor">
+            <a:schemeClr val="lt1"/>
+          </a:fontRef>
+        </p:style>
+        <p:txBody>
+          <a:bodyPr lIns="914400" tIns="91440" rIns="914400" bIns="91440" rtlCol="0" anchor="ctr"/>
+          <a:lstStyle/>
+          <a:p>
+            <a:pPr marL="0" marR="0" lvl="0" indent="0" algn="l" defTabSz="914400" rtl="0" eaLnBrk="1" fontAlgn="auto" latinLnBrk="0" hangingPunct="1">
+              <a:lnSpc>
+                <a:spcPct val="100000"/>
+              </a:lnSpc>
+              <a:spcBef>
+                <a:spcPts val="0"/>
+              </a:spcBef>
+              <a:spcAft>
+                <a:spcPts val="0"/>
+              </a:spcAft>
+              <a:buClrTx/>
+              <a:buSzTx/>
+              <a:buFontTx/>
+              <a:buNone/>
+              <a:tabLst/>
+              <a:defRPr/>
+            </a:pPr>
+            <a:r>
+              <a:rPr kumimoji="0" lang="en-US" sz="3700" b="1" i="0" u="none" strike="noStrike" kern="0" cap="none" spc="0" normalizeH="0" baseline="0" noProof="0">
+                <a:ln>
+                  <a:noFill/>
+                </a:ln>
+                <a:solidFill>
+                  <a:prstClr val="white"/>
+                </a:solidFill>
+                <a:effectLst/>
+                <a:uLnTx/>
+                <a:uFillTx/>
+                <a:latin typeface="Aptos" panose="02110004020202020204"/>
+                <a:ea typeface="+mn-lt"/>
+                <a:cs typeface="+mn-lt"/>
+              </a:rPr>
+              <a:t>Northwestern IT </a:t>
+            </a:r>
+            <a:br>
+              <a:rPr kumimoji="0" lang="en-US" sz="3700" b="1" i="0" u="none" strike="noStrike" kern="0" cap="none" spc="0" normalizeH="0" baseline="0" noProof="0">
+                <a:ln>
+                  <a:noFill/>
+                </a:ln>
+                <a:solidFill>
+                  <a:prstClr val="white"/>
+                </a:solidFill>
+                <a:effectLst/>
+                <a:uLnTx/>
+                <a:uFillTx/>
+                <a:latin typeface="Aptos" panose="02110004020202020204"/>
+                <a:ea typeface="+mn-lt"/>
+                <a:cs typeface="+mn-lt"/>
+              </a:rPr>
+            </a:br>
+            <a:r>
+              <a:rPr kumimoji="0" lang="en-US" sz="3700" b="1" i="0" u="none" strike="noStrike" kern="0" cap="none" spc="0" normalizeH="0" baseline="0" noProof="0">
+                <a:ln>
+                  <a:noFill/>
+                </a:ln>
+                <a:solidFill>
+                  <a:prstClr val="white"/>
+                </a:solidFill>
+                <a:effectLst/>
+                <a:uLnTx/>
+                <a:uFillTx/>
+                <a:latin typeface="Aptos" panose="02110004020202020204"/>
+                <a:ea typeface="+mn-lt"/>
+                <a:cs typeface="+mn-lt"/>
+              </a:rPr>
+              <a:t>Research Computing and Data Services</a:t>
+            </a:r>
+            <a:endParaRPr kumimoji="0" lang="en-US" sz="1800" b="0" i="0" u="none" strike="noStrike" kern="1200" cap="none" spc="0" normalizeH="0" baseline="0" noProof="0">
+              <a:ln>
+                <a:noFill/>
+              </a:ln>
+              <a:solidFill>
+                <a:prstClr val="white"/>
+              </a:solidFill>
+              <a:effectLst/>
+              <a:uLnTx/>
+              <a:uFillTx/>
+              <a:latin typeface="Aptos" panose="02110004020202020204"/>
+              <a:ea typeface="+mn-ea"/>
+              <a:cs typeface="+mn-cs"/>
+            </a:endParaRPr>
+          </a:p>
+        </p:txBody>
+      </p:sp>
+    </p:spTree>
+    <p:extLst>
+      <p:ext uri="{BB962C8B-B14F-4D97-AF65-F5344CB8AC3E}">
+        <p14:creationId xmlns:p14="http://schemas.microsoft.com/office/powerpoint/2010/main" val="4030650292"/>
+      </p:ext>
+    </p:extLst>
+  </p:cSld>
+  <p:clrMapOvr>
+    <a:masterClrMapping/>
+  </p:clrMapOvr>
+</p:sld>
+</file>
+
+<file path=ppt/slides/slide30.xml><?xml version="1.0" encoding="utf-8"?>
 <p:sld xmlns:a="http://schemas.openxmlformats.org/drawingml/2006/main" xmlns:r="http://schemas.openxmlformats.org/officeDocument/2006/relationships" xmlns:p="http://schemas.openxmlformats.org/presentationml/2006/main">
   <p:cSld>
     <p:spTree>
@@ -44680,438 +45547,6 @@
 </p:sld>
 </file>
 
-<file path=ppt/slides/slide3.xml><?xml version="1.0" encoding="utf-8"?>
-<p:sld xmlns:a="http://schemas.openxmlformats.org/drawingml/2006/main" xmlns:r="http://schemas.openxmlformats.org/officeDocument/2006/relationships" xmlns:p="http://schemas.openxmlformats.org/presentationml/2006/main">
-  <p:cSld>
-    <p:spTree>
-      <p:nvGrpSpPr>
-        <p:cNvPr id="1" name=""/>
-        <p:cNvGrpSpPr/>
-        <p:nvPr/>
-      </p:nvGrpSpPr>
-      <p:grpSpPr>
-        <a:xfrm>
-          <a:off x="0" y="0"/>
-          <a:ext cx="0" cy="0"/>
-          <a:chOff x="0" y="0"/>
-          <a:chExt cx="0" cy="0"/>
-        </a:xfrm>
-      </p:grpSpPr>
-      <p:sp>
-        <p:nvSpPr>
-          <p:cNvPr id="2" name="Title 1">
-            <a:extLst>
-              <a:ext uri="{FF2B5EF4-FFF2-40B4-BE49-F238E27FC236}">
-                <a16:creationId xmlns:a16="http://schemas.microsoft.com/office/drawing/2014/main" id="{525A8237-7538-F82E-CF5E-70052A370BBF}"/>
-              </a:ext>
-            </a:extLst>
-          </p:cNvPr>
-          <p:cNvSpPr>
-            <a:spLocks noGrp="1"/>
-          </p:cNvSpPr>
-          <p:nvPr>
-            <p:ph type="title"/>
-          </p:nvPr>
-        </p:nvSpPr>
-        <p:spPr/>
-        <p:txBody>
-          <a:bodyPr/>
-          <a:lstStyle/>
-          <a:p>
-            <a:r>
-              <a:rPr lang="en-US" b="1">
-                <a:solidFill>
-                  <a:srgbClr val="4E2A84"/>
-                </a:solidFill>
-              </a:rPr>
-              <a:t>This workshop is brought to you by:</a:t>
-            </a:r>
-          </a:p>
-        </p:txBody>
-      </p:sp>
-      <p:sp>
-        <p:nvSpPr>
-          <p:cNvPr id="3" name="Content Placeholder 2">
-            <a:extLst>
-              <a:ext uri="{FF2B5EF4-FFF2-40B4-BE49-F238E27FC236}">
-                <a16:creationId xmlns:a16="http://schemas.microsoft.com/office/drawing/2014/main" id="{22736DF4-919B-F686-3891-6FD730359CE9}"/>
-              </a:ext>
-            </a:extLst>
-          </p:cNvPr>
-          <p:cNvSpPr>
-            <a:spLocks noGrp="1"/>
-          </p:cNvSpPr>
-          <p:nvPr>
-            <p:ph idx="1"/>
-          </p:nvPr>
-        </p:nvSpPr>
-        <p:spPr>
-          <a:xfrm>
-            <a:off x="838200" y="2457048"/>
-            <a:ext cx="10515600" cy="4703763"/>
-          </a:xfrm>
-        </p:spPr>
-        <p:txBody>
-          <a:bodyPr vert="horz" lIns="91440" tIns="45720" rIns="91440" bIns="45720" rtlCol="0" anchor="t">
-            <a:normAutofit/>
-          </a:bodyPr>
-          <a:lstStyle/>
-          <a:p>
-            <a:pPr marL="0" indent="0" algn="ctr">
-              <a:buNone/>
-            </a:pPr>
-            <a:r>
-              <a:rPr lang="en-US" b="1"/>
-              <a:t>Need help?</a:t>
-            </a:r>
-          </a:p>
-          <a:p>
-            <a:r>
-              <a:rPr lang="en-US" sz="2400"/>
-              <a:t>AI, Machine Learning, Data Science</a:t>
-            </a:r>
-          </a:p>
-          <a:p>
-            <a:r>
-              <a:rPr lang="en-US" sz="2400"/>
-              <a:t>Statistics</a:t>
-            </a:r>
-          </a:p>
-          <a:p>
-            <a:r>
-              <a:rPr lang="en-US" sz="2400"/>
-              <a:t>Visualization</a:t>
-            </a:r>
-          </a:p>
-          <a:p>
-            <a:pPr marL="228600" marR="0" lvl="0" indent="-228600" algn="l" defTabSz="914400" rtl="0" eaLnBrk="1" fontAlgn="base" latinLnBrk="0" hangingPunct="1">
-              <a:lnSpc>
-                <a:spcPct val="90000"/>
-              </a:lnSpc>
-              <a:spcBef>
-                <a:spcPts val="1000"/>
-              </a:spcBef>
-              <a:spcAft>
-                <a:spcPts val="0"/>
-              </a:spcAft>
-              <a:buClrTx/>
-              <a:buSzTx/>
-              <a:buFont typeface="Arial" panose="020B0604020202020204" pitchFamily="34" charset="0"/>
-              <a:buChar char="•"/>
-              <a:tabLst/>
-              <a:defRPr/>
-            </a:pPr>
-            <a:r>
-              <a:rPr kumimoji="0" lang="en-US" sz="2400" b="0" i="0" u="none" strike="noStrike" kern="1200" cap="none" spc="0" normalizeH="0" baseline="0" noProof="0">
-                <a:ln>
-                  <a:noFill/>
-                </a:ln>
-                <a:solidFill>
-                  <a:prstClr val="black"/>
-                </a:solidFill>
-                <a:effectLst/>
-                <a:uLnTx/>
-                <a:uFillTx/>
-                <a:latin typeface="Aptos" panose="02110004020202020204"/>
-                <a:ea typeface="+mn-ea"/>
-                <a:cs typeface="+mn-cs"/>
-              </a:rPr>
-              <a:t>Data Collection, Cleaning​, Analysis, Management ...</a:t>
-            </a:r>
-          </a:p>
-          <a:p>
-            <a:pPr marL="228600" marR="0" lvl="0" indent="-228600" algn="l" defTabSz="914400" rtl="0" eaLnBrk="1" fontAlgn="base" latinLnBrk="0" hangingPunct="1">
-              <a:lnSpc>
-                <a:spcPct val="90000"/>
-              </a:lnSpc>
-              <a:spcBef>
-                <a:spcPts val="1000"/>
-              </a:spcBef>
-              <a:spcAft>
-                <a:spcPts val="0"/>
-              </a:spcAft>
-              <a:buClrTx/>
-              <a:buSzTx/>
-              <a:buFont typeface="Arial" panose="020B0604020202020204" pitchFamily="34" charset="0"/>
-              <a:buChar char="•"/>
-              <a:tabLst/>
-              <a:defRPr/>
-            </a:pPr>
-            <a:r>
-              <a:rPr kumimoji="0" lang="en-US" sz="2400" b="0" i="0" u="none" strike="noStrike" kern="1200" cap="none" spc="0" normalizeH="0" baseline="0" noProof="0">
-                <a:ln>
-                  <a:noFill/>
-                </a:ln>
-                <a:solidFill>
-                  <a:prstClr val="black"/>
-                </a:solidFill>
-                <a:effectLst/>
-                <a:uLnTx/>
-                <a:uFillTx/>
-                <a:latin typeface="Aptos" panose="02110004020202020204"/>
-                <a:ea typeface="+mn-ea"/>
-                <a:cs typeface="+mn-cs"/>
-              </a:rPr>
-              <a:t>Scraping, Text Analysis, Computing, Reproducibility ...</a:t>
-            </a:r>
-          </a:p>
-          <a:p>
-            <a:pPr marL="228600" marR="0" lvl="0" indent="-228600" algn="l" defTabSz="914400" rtl="0" eaLnBrk="1" fontAlgn="auto" latinLnBrk="0" hangingPunct="1">
-              <a:lnSpc>
-                <a:spcPct val="90000"/>
-              </a:lnSpc>
-              <a:spcBef>
-                <a:spcPts val="1000"/>
-              </a:spcBef>
-              <a:spcAft>
-                <a:spcPts val="0"/>
-              </a:spcAft>
-              <a:buClrTx/>
-              <a:buSzTx/>
-              <a:buFont typeface="Arial" panose="020B0604020202020204" pitchFamily="34" charset="0"/>
-              <a:buChar char="•"/>
-              <a:tabLst/>
-              <a:defRPr/>
-            </a:pPr>
-            <a:r>
-              <a:rPr kumimoji="0" lang="en-US" sz="2400" b="0" i="0" u="none" strike="noStrike" kern="1200" cap="none" spc="0" normalizeH="0" baseline="0" noProof="0">
-                <a:ln>
-                  <a:noFill/>
-                </a:ln>
-                <a:solidFill>
-                  <a:prstClr val="black"/>
-                </a:solidFill>
-                <a:effectLst/>
-                <a:uLnTx/>
-                <a:uFillTx/>
-                <a:latin typeface="Aptos" panose="02110004020202020204"/>
-                <a:ea typeface="+mn-ea"/>
-                <a:cs typeface="+mn-cs"/>
-              </a:rPr>
-              <a:t>R, Python, SQL, MATLAB, Stata, SPSS, SAS, etc.</a:t>
-            </a:r>
-            <a:endParaRPr lang="en-US"/>
-          </a:p>
-          <a:p>
-            <a:pPr marL="0" indent="0" algn="ctr">
-              <a:spcBef>
-                <a:spcPts val="3400"/>
-              </a:spcBef>
-              <a:buNone/>
-            </a:pPr>
-            <a:r>
-              <a:rPr lang="en-US" sz="2800">
-                <a:ea typeface="+mn-lt"/>
-                <a:cs typeface="+mn-lt"/>
-              </a:rPr>
-              <a:t>Request a </a:t>
-            </a:r>
-            <a:r>
-              <a:rPr lang="en-US" b="1">
-                <a:solidFill>
-                  <a:srgbClr val="00B050"/>
-                </a:solidFill>
-                <a:ea typeface="+mn-lt"/>
-                <a:cs typeface="+mn-lt"/>
-              </a:rPr>
-              <a:t>FREE</a:t>
-            </a:r>
-            <a:r>
-              <a:rPr lang="en-US">
-                <a:solidFill>
-                  <a:srgbClr val="00B050"/>
-                </a:solidFill>
-                <a:ea typeface="+mn-lt"/>
-                <a:cs typeface="+mn-lt"/>
-              </a:rPr>
-              <a:t> </a:t>
-            </a:r>
-            <a:r>
-              <a:rPr lang="en-US">
-                <a:ea typeface="+mn-lt"/>
-                <a:cs typeface="+mn-lt"/>
-              </a:rPr>
-              <a:t>consultation at</a:t>
-            </a:r>
-            <a:r>
-              <a:rPr lang="en-US" sz="2800">
-                <a:ea typeface="+mn-lt"/>
-                <a:cs typeface="+mn-lt"/>
-              </a:rPr>
-              <a:t> </a:t>
-            </a:r>
-            <a:r>
-              <a:rPr lang="en-US" sz="2800" b="1">
-                <a:solidFill>
-                  <a:srgbClr val="7030A0"/>
-                </a:solidFill>
-                <a:ea typeface="+mn-lt"/>
-                <a:cs typeface="+mn-lt"/>
-                <a:hlinkClick r:id="rId3">
-                  <a:extLst>
-                    <a:ext uri="{A12FA001-AC4F-418D-AE19-62706E023703}">
-                      <ahyp:hlinkClr xmlns:ahyp="http://schemas.microsoft.com/office/drawing/2018/hyperlinkcolor" val="tx"/>
-                    </a:ext>
-                  </a:extLst>
-                </a:hlinkClick>
-              </a:rPr>
-              <a:t>bit.ly/rcdsconsult</a:t>
-            </a:r>
-            <a:r>
-              <a:rPr lang="en-US" sz="2800">
-                <a:ea typeface="+mn-lt"/>
-                <a:cs typeface="+mn-lt"/>
-              </a:rPr>
-              <a:t>.</a:t>
-            </a:r>
-            <a:endParaRPr lang="en-US" sz="2000"/>
-          </a:p>
-        </p:txBody>
-      </p:sp>
-      <p:sp>
-        <p:nvSpPr>
-          <p:cNvPr id="6" name="Rectangle 5">
-            <a:extLst>
-              <a:ext uri="{FF2B5EF4-FFF2-40B4-BE49-F238E27FC236}">
-                <a16:creationId xmlns:a16="http://schemas.microsoft.com/office/drawing/2014/main" id="{3009FC79-E7F4-9004-8097-D165F9AA0BAE}"/>
-              </a:ext>
-            </a:extLst>
-          </p:cNvPr>
-          <p:cNvSpPr/>
-          <p:nvPr/>
-        </p:nvSpPr>
-        <p:spPr>
-          <a:xfrm>
-            <a:off x="0" y="1158166"/>
-            <a:ext cx="12192000" cy="1278973"/>
-          </a:xfrm>
-          <a:prstGeom prst="rect">
-            <a:avLst/>
-          </a:prstGeom>
-          <a:solidFill>
-            <a:srgbClr val="4E2A84"/>
-          </a:solidFill>
-          <a:ln>
-            <a:noFill/>
-          </a:ln>
-        </p:spPr>
-        <p:style>
-          <a:lnRef idx="2">
-            <a:schemeClr val="accent1">
-              <a:shade val="15000"/>
-            </a:schemeClr>
-          </a:lnRef>
-          <a:fillRef idx="1">
-            <a:schemeClr val="accent1"/>
-          </a:fillRef>
-          <a:effectRef idx="0">
-            <a:schemeClr val="accent1"/>
-          </a:effectRef>
-          <a:fontRef idx="minor">
-            <a:schemeClr val="lt1"/>
-          </a:fontRef>
-        </p:style>
-        <p:txBody>
-          <a:bodyPr lIns="914400" tIns="91440" rIns="914400" bIns="91440" rtlCol="0" anchor="ctr"/>
-          <a:lstStyle/>
-          <a:p>
-            <a:pPr marL="0" marR="0" lvl="0" indent="0" algn="l" defTabSz="914400" rtl="0" eaLnBrk="1" fontAlgn="auto" latinLnBrk="0" hangingPunct="1">
-              <a:lnSpc>
-                <a:spcPct val="100000"/>
-              </a:lnSpc>
-              <a:spcBef>
-                <a:spcPts val="0"/>
-              </a:spcBef>
-              <a:spcAft>
-                <a:spcPts val="0"/>
-              </a:spcAft>
-              <a:buClrTx/>
-              <a:buSzTx/>
-              <a:buFontTx/>
-              <a:buNone/>
-              <a:tabLst/>
-              <a:defRPr/>
-            </a:pPr>
-            <a:r>
-              <a:rPr kumimoji="0" lang="en-US" sz="3700" b="1" i="0" u="none" strike="noStrike" kern="0" cap="none" spc="0" normalizeH="0" baseline="0" noProof="0">
-                <a:ln>
-                  <a:noFill/>
-                </a:ln>
-                <a:solidFill>
-                  <a:prstClr val="white"/>
-                </a:solidFill>
-                <a:effectLst/>
-                <a:uLnTx/>
-                <a:uFillTx/>
-                <a:latin typeface="Aptos" panose="02110004020202020204"/>
-                <a:ea typeface="+mn-lt"/>
-                <a:cs typeface="+mn-lt"/>
-              </a:rPr>
-              <a:t>Northwestern IT </a:t>
-            </a:r>
-            <a:br>
-              <a:rPr kumimoji="0" lang="en-US" sz="3700" b="1" i="0" u="none" strike="noStrike" kern="0" cap="none" spc="0" normalizeH="0" baseline="0" noProof="0">
-                <a:ln>
-                  <a:noFill/>
-                </a:ln>
-                <a:solidFill>
-                  <a:prstClr val="white"/>
-                </a:solidFill>
-                <a:effectLst/>
-                <a:uLnTx/>
-                <a:uFillTx/>
-                <a:latin typeface="Aptos" panose="02110004020202020204"/>
-                <a:ea typeface="+mn-lt"/>
-                <a:cs typeface="+mn-lt"/>
-              </a:rPr>
-            </a:br>
-            <a:r>
-              <a:rPr kumimoji="0" lang="en-US" sz="3700" b="1" i="0" u="none" strike="noStrike" kern="0" cap="none" spc="0" normalizeH="0" baseline="0" noProof="0">
-                <a:ln>
-                  <a:noFill/>
-                </a:ln>
-                <a:solidFill>
-                  <a:prstClr val="white"/>
-                </a:solidFill>
-                <a:effectLst/>
-                <a:uLnTx/>
-                <a:uFillTx/>
-                <a:latin typeface="Aptos" panose="02110004020202020204"/>
-                <a:ea typeface="+mn-lt"/>
-                <a:cs typeface="+mn-lt"/>
-              </a:rPr>
-              <a:t>Research Computing and Data Services</a:t>
-            </a:r>
-            <a:endParaRPr kumimoji="0" lang="en-US" sz="1800" b="0" i="0" u="none" strike="noStrike" kern="1200" cap="none" spc="0" normalizeH="0" baseline="0" noProof="0">
-              <a:ln>
-                <a:noFill/>
-              </a:ln>
-              <a:solidFill>
-                <a:prstClr val="white"/>
-              </a:solidFill>
-              <a:effectLst/>
-              <a:uLnTx/>
-              <a:uFillTx/>
-              <a:latin typeface="Aptos" panose="02110004020202020204"/>
-              <a:ea typeface="+mn-ea"/>
-              <a:cs typeface="+mn-cs"/>
-            </a:endParaRPr>
-          </a:p>
-        </p:txBody>
-      </p:sp>
-    </p:spTree>
-    <p:extLst>
-      <p:ext uri="{BB962C8B-B14F-4D97-AF65-F5344CB8AC3E}">
-        <p14:creationId xmlns:p14="http://schemas.microsoft.com/office/powerpoint/2010/main" val="4030650292"/>
-      </p:ext>
-    </p:extLst>
-  </p:cSld>
-  <p:clrMapOvr>
-    <a:masterClrMapping/>
-  </p:clrMapOvr>
-</p:sld>
-</file>
-
 <file path=ppt/slides/slide4.xml><?xml version="1.0" encoding="utf-8"?>
 <p:sld xmlns:a="http://schemas.openxmlformats.org/drawingml/2006/main" xmlns:r="http://schemas.openxmlformats.org/officeDocument/2006/relationships" xmlns:p="http://schemas.openxmlformats.org/presentationml/2006/main">
   <p:cSld>
@@ -46842,6 +47277,15 @@
 </file>
 
 <file path=customXml/item2.xml><?xml version="1.0" encoding="utf-8"?>
+<?mso-contentType ?>
+<FormTemplates xmlns="http://schemas.microsoft.com/sharepoint/v3/contenttype/forms">
+  <Display>DocumentLibraryForm</Display>
+  <Edit>DocumentLibraryForm</Edit>
+  <New>DocumentLibraryForm</New>
+</FormTemplates>
+</file>
+
+<file path=customXml/item3.xml><?xml version="1.0" encoding="utf-8"?>
 <ct:contentTypeSchema xmlns:ct="http://schemas.microsoft.com/office/2006/metadata/contentType" xmlns:ma="http://schemas.microsoft.com/office/2006/metadata/properties/metaAttributes" ct:_="" ma:_="" ma:contentTypeName="Document" ma:contentTypeID="0x010100A0BC9924B2BE754D9B1ADDA1D4CEDCCC" ma:contentTypeVersion="20" ma:contentTypeDescription="Create a new document." ma:contentTypeScope="" ma:versionID="4338fadee27a2b349d14c729eca432ee">
   <xsd:schema xmlns:xsd="http://www.w3.org/2001/XMLSchema" xmlns:xs="http://www.w3.org/2001/XMLSchema" xmlns:p="http://schemas.microsoft.com/office/2006/metadata/properties" xmlns:ns2="2abaa01e-9938-407e-aa0b-10580c653abd" xmlns:ns3="7be34c64-93b8-4842-bfae-c3106b8c53c2" xmlns:ns4="efce84db-8738-4c7b-9bdc-65b9500871f6" targetNamespace="http://schemas.microsoft.com/office/2006/metadata/properties" ma:root="true" ma:fieldsID="edf0bcebcd0cdd63ab6270adfc88f193" ns2:_="" ns3:_="" ns4:_="">
     <xsd:import namespace="2abaa01e-9938-407e-aa0b-10580c653abd"/>
@@ -47109,15 +47553,6 @@
 </ct:contentTypeSchema>
 </file>
 
-<file path=customXml/item3.xml><?xml version="1.0" encoding="utf-8"?>
-<?mso-contentType ?>
-<FormTemplates xmlns="http://schemas.microsoft.com/sharepoint/v3/contenttype/forms">
-  <Display>DocumentLibraryForm</Display>
-  <Edit>DocumentLibraryForm</Edit>
-  <New>DocumentLibraryForm</New>
-</FormTemplates>
-</file>
-
 <file path=customXml/itemProps1.xml><?xml version="1.0" encoding="utf-8"?>
 <ds:datastoreItem xmlns:ds="http://schemas.openxmlformats.org/officeDocument/2006/customXml" ds:itemID="{EA50D382-76B0-429E-B840-7F3F17F09516}">
   <ds:schemaRefs>
@@ -47137,6 +47572,14 @@
 </file>
 
 <file path=customXml/itemProps2.xml><?xml version="1.0" encoding="utf-8"?>
+<ds:datastoreItem xmlns:ds="http://schemas.openxmlformats.org/officeDocument/2006/customXml" ds:itemID="{D066BF6C-F5E2-4C45-BA45-6D84AAED0759}">
+  <ds:schemaRefs>
+    <ds:schemaRef ds:uri="http://schemas.microsoft.com/sharepoint/v3/contenttype/forms"/>
+  </ds:schemaRefs>
+</ds:datastoreItem>
+</file>
+
+<file path=customXml/itemProps3.xml><?xml version="1.0" encoding="utf-8"?>
 <ds:datastoreItem xmlns:ds="http://schemas.openxmlformats.org/officeDocument/2006/customXml" ds:itemID="{C6167ACF-5A1C-430B-8C24-0F858D18080E}">
   <ds:schemaRefs>
     <ds:schemaRef ds:uri="http://schemas.microsoft.com/office/2006/metadata/contentType"/>
@@ -47154,12 +47597,4 @@
     <ds:schemaRef ds:uri="http://schemas.microsoft.com/internal/obd"/>
   </ds:schemaRefs>
 </ds:datastoreItem>
-</file>
-
-<file path=customXml/itemProps3.xml><?xml version="1.0" encoding="utf-8"?>
-<ds:datastoreItem xmlns:ds="http://schemas.openxmlformats.org/officeDocument/2006/customXml" ds:itemID="{D066BF6C-F5E2-4C45-BA45-6D84AAED0759}">
-  <ds:schemaRefs>
-    <ds:schemaRef ds:uri="http://schemas.microsoft.com/sharepoint/v3/contenttype/forms"/>
-  </ds:schemaRefs>
-</ds:datastoreItem>
 </file>
</xml_diff>